<commit_message>
Added example with image to channel delay
</commit_message>
<xml_diff>
--- a/docs/img/Drawings.pptx
+++ b/docs/img/Drawings.pptx
@@ -9,6 +9,8 @@
     <p:sldId id="259" r:id="rId3"/>
     <p:sldId id="260" r:id="rId4"/>
     <p:sldId id="258" r:id="rId5"/>
+    <p:sldId id="261" r:id="rId6"/>
+    <p:sldId id="262" r:id="rId7"/>
   </p:sldIdLst>
   <p:sldSz cx="12192000" cy="6858000"/>
   <p:notesSz cx="6858000" cy="9144000"/>
@@ -246,7 +248,7 @@
           <a:p>
             <a:fld id="{16971917-D253-43D2-8D2E-939B69542835}" type="datetimeFigureOut">
               <a:rPr lang="en-US" smtClean="0"/>
-              <a:t>3/22/2022</a:t>
+              <a:t>11/22/2022</a:t>
             </a:fld>
             <a:endParaRPr lang="en-US" dirty="0"/>
           </a:p>
@@ -416,7 +418,7 @@
           <a:p>
             <a:fld id="{16971917-D253-43D2-8D2E-939B69542835}" type="datetimeFigureOut">
               <a:rPr lang="en-US" smtClean="0"/>
-              <a:t>3/22/2022</a:t>
+              <a:t>11/22/2022</a:t>
             </a:fld>
             <a:endParaRPr lang="en-US" dirty="0"/>
           </a:p>
@@ -596,7 +598,7 @@
           <a:p>
             <a:fld id="{16971917-D253-43D2-8D2E-939B69542835}" type="datetimeFigureOut">
               <a:rPr lang="en-US" smtClean="0"/>
-              <a:t>3/22/2022</a:t>
+              <a:t>11/22/2022</a:t>
             </a:fld>
             <a:endParaRPr lang="en-US" dirty="0"/>
           </a:p>
@@ -766,7 +768,7 @@
           <a:p>
             <a:fld id="{16971917-D253-43D2-8D2E-939B69542835}" type="datetimeFigureOut">
               <a:rPr lang="en-US" smtClean="0"/>
-              <a:t>3/22/2022</a:t>
+              <a:t>11/22/2022</a:t>
             </a:fld>
             <a:endParaRPr lang="en-US" dirty="0"/>
           </a:p>
@@ -1012,7 +1014,7 @@
           <a:p>
             <a:fld id="{16971917-D253-43D2-8D2E-939B69542835}" type="datetimeFigureOut">
               <a:rPr lang="en-US" smtClean="0"/>
-              <a:t>3/22/2022</a:t>
+              <a:t>11/22/2022</a:t>
             </a:fld>
             <a:endParaRPr lang="en-US" dirty="0"/>
           </a:p>
@@ -1244,7 +1246,7 @@
           <a:p>
             <a:fld id="{16971917-D253-43D2-8D2E-939B69542835}" type="datetimeFigureOut">
               <a:rPr lang="en-US" smtClean="0"/>
-              <a:t>3/22/2022</a:t>
+              <a:t>11/22/2022</a:t>
             </a:fld>
             <a:endParaRPr lang="en-US" dirty="0"/>
           </a:p>
@@ -1611,7 +1613,7 @@
           <a:p>
             <a:fld id="{16971917-D253-43D2-8D2E-939B69542835}" type="datetimeFigureOut">
               <a:rPr lang="en-US" smtClean="0"/>
-              <a:t>3/22/2022</a:t>
+              <a:t>11/22/2022</a:t>
             </a:fld>
             <a:endParaRPr lang="en-US" dirty="0"/>
           </a:p>
@@ -1729,7 +1731,7 @@
           <a:p>
             <a:fld id="{16971917-D253-43D2-8D2E-939B69542835}" type="datetimeFigureOut">
               <a:rPr lang="en-US" smtClean="0"/>
-              <a:t>3/22/2022</a:t>
+              <a:t>11/22/2022</a:t>
             </a:fld>
             <a:endParaRPr lang="en-US" dirty="0"/>
           </a:p>
@@ -1824,7 +1826,7 @@
           <a:p>
             <a:fld id="{16971917-D253-43D2-8D2E-939B69542835}" type="datetimeFigureOut">
               <a:rPr lang="en-US" smtClean="0"/>
-              <a:t>3/22/2022</a:t>
+              <a:t>11/22/2022</a:t>
             </a:fld>
             <a:endParaRPr lang="en-US" dirty="0"/>
           </a:p>
@@ -2101,7 +2103,7 @@
           <a:p>
             <a:fld id="{16971917-D253-43D2-8D2E-939B69542835}" type="datetimeFigureOut">
               <a:rPr lang="en-US" smtClean="0"/>
-              <a:t>3/22/2022</a:t>
+              <a:t>11/22/2022</a:t>
             </a:fld>
             <a:endParaRPr lang="en-US" dirty="0"/>
           </a:p>
@@ -2354,7 +2356,7 @@
           <a:p>
             <a:fld id="{16971917-D253-43D2-8D2E-939B69542835}" type="datetimeFigureOut">
               <a:rPr lang="en-US" smtClean="0"/>
-              <a:t>3/22/2022</a:t>
+              <a:t>11/22/2022</a:t>
             </a:fld>
             <a:endParaRPr lang="en-US" dirty="0"/>
           </a:p>
@@ -2567,7 +2569,7 @@
           <a:p>
             <a:fld id="{16971917-D253-43D2-8D2E-939B69542835}" type="datetimeFigureOut">
               <a:rPr lang="en-US" smtClean="0"/>
-              <a:t>3/22/2022</a:t>
+              <a:t>11/22/2022</a:t>
             </a:fld>
             <a:endParaRPr lang="en-US" dirty="0"/>
           </a:p>
@@ -3854,15 +3856,7 @@
           <a:p>
             <a:r>
               <a:rPr lang="en-GB" sz="800" dirty="0" smtClean="0"/>
-              <a:t>y</a:t>
-            </a:r>
-            <a:r>
-              <a:rPr lang="en-GB" sz="800" dirty="0" smtClean="0"/>
-              <a:t>(t</a:t>
-            </a:r>
-            <a:r>
-              <a:rPr lang="en-GB" sz="800" dirty="0" smtClean="0"/>
-              <a:t>)</a:t>
+              <a:t>y(t)</a:t>
             </a:r>
             <a:endParaRPr lang="en-US" sz="800" dirty="0"/>
           </a:p>
@@ -5412,6 +5406,3143 @@
       </p:par>
     </p:tnLst>
   </p:timing>
+</p:sld>
+</file>
+
+<file path=ppt/slides/slide5.xml><?xml version="1.0" encoding="utf-8"?>
+<p:sld xmlns:a="http://schemas.openxmlformats.org/drawingml/2006/main" xmlns:r="http://schemas.openxmlformats.org/officeDocument/2006/relationships" xmlns:p="http://schemas.openxmlformats.org/presentationml/2006/main">
+  <p:cSld>
+    <p:spTree>
+      <p:nvGrpSpPr>
+        <p:cNvPr id="1" name=""/>
+        <p:cNvGrpSpPr/>
+        <p:nvPr/>
+      </p:nvGrpSpPr>
+      <p:grpSpPr>
+        <a:xfrm>
+          <a:off x="0" y="0"/>
+          <a:ext cx="0" cy="0"/>
+          <a:chOff x="0" y="0"/>
+          <a:chExt cx="0" cy="0"/>
+        </a:xfrm>
+      </p:grpSpPr>
+      <p:cxnSp>
+        <p:nvCxnSpPr>
+          <p:cNvPr id="30" name="Straight Connector 29"/>
+          <p:cNvCxnSpPr/>
+          <p:nvPr/>
+        </p:nvCxnSpPr>
+        <p:spPr>
+          <a:xfrm>
+            <a:off x="2102605" y="2892490"/>
+            <a:ext cx="0" cy="1791477"/>
+          </a:xfrm>
+          <a:prstGeom prst="line">
+            <a:avLst/>
+          </a:prstGeom>
+          <a:ln>
+            <a:solidFill>
+              <a:schemeClr val="accent2">
+                <a:lumMod val="75000"/>
+              </a:schemeClr>
+            </a:solidFill>
+            <a:prstDash val="dash"/>
+          </a:ln>
+        </p:spPr>
+        <p:style>
+          <a:lnRef idx="1">
+            <a:schemeClr val="accent1"/>
+          </a:lnRef>
+          <a:fillRef idx="0">
+            <a:schemeClr val="accent1"/>
+          </a:fillRef>
+          <a:effectRef idx="0">
+            <a:schemeClr val="accent1"/>
+          </a:effectRef>
+          <a:fontRef idx="minor">
+            <a:schemeClr val="tx1"/>
+          </a:fontRef>
+        </p:style>
+      </p:cxnSp>
+      <p:cxnSp>
+        <p:nvCxnSpPr>
+          <p:cNvPr id="5" name="Straight Connector 4"/>
+          <p:cNvCxnSpPr/>
+          <p:nvPr/>
+        </p:nvCxnSpPr>
+        <p:spPr>
+          <a:xfrm>
+            <a:off x="2102272" y="955625"/>
+            <a:ext cx="3599411" cy="0"/>
+          </a:xfrm>
+          <a:prstGeom prst="line">
+            <a:avLst/>
+          </a:prstGeom>
+          <a:ln>
+            <a:headEnd type="diamond"/>
+            <a:tailEnd type="diamond"/>
+          </a:ln>
+        </p:spPr>
+        <p:style>
+          <a:lnRef idx="1">
+            <a:schemeClr val="accent1"/>
+          </a:lnRef>
+          <a:fillRef idx="0">
+            <a:schemeClr val="accent1"/>
+          </a:fillRef>
+          <a:effectRef idx="0">
+            <a:schemeClr val="accent1"/>
+          </a:effectRef>
+          <a:fontRef idx="minor">
+            <a:schemeClr val="tx1"/>
+          </a:fontRef>
+        </p:style>
+      </p:cxnSp>
+      <p:sp>
+        <p:nvSpPr>
+          <p:cNvPr id="6" name="TextBox 5"/>
+          <p:cNvSpPr txBox="1"/>
+          <p:nvPr/>
+        </p:nvSpPr>
+        <p:spPr>
+          <a:xfrm>
+            <a:off x="1960956" y="972246"/>
+            <a:ext cx="290945" cy="338554"/>
+          </a:xfrm>
+          <a:prstGeom prst="rect">
+            <a:avLst/>
+          </a:prstGeom>
+          <a:noFill/>
+        </p:spPr>
+        <p:txBody>
+          <a:bodyPr wrap="square" rtlCol="0">
+            <a:spAutoFit/>
+          </a:bodyPr>
+          <a:lstStyle/>
+          <a:p>
+            <a:r>
+              <a:rPr lang="en-GB" sz="1600" noProof="1" smtClean="0"/>
+              <a:t>0</a:t>
+            </a:r>
+            <a:endParaRPr lang="en-GB" sz="1600" noProof="1"/>
+          </a:p>
+        </p:txBody>
+      </p:sp>
+      <p:sp>
+        <p:nvSpPr>
+          <p:cNvPr id="7" name="TextBox 6"/>
+          <p:cNvSpPr txBox="1"/>
+          <p:nvPr/>
+        </p:nvSpPr>
+        <p:spPr>
+          <a:xfrm>
+            <a:off x="5473083" y="980559"/>
+            <a:ext cx="619299" cy="338554"/>
+          </a:xfrm>
+          <a:prstGeom prst="rect">
+            <a:avLst/>
+          </a:prstGeom>
+          <a:noFill/>
+        </p:spPr>
+        <p:txBody>
+          <a:bodyPr wrap="square" rtlCol="0">
+            <a:spAutoFit/>
+          </a:bodyPr>
+          <a:lstStyle/>
+          <a:p>
+            <a:r>
+              <a:rPr lang="en-GB" sz="1600" noProof="1" smtClean="0"/>
+              <a:t>100</a:t>
+            </a:r>
+            <a:endParaRPr lang="en-GB" sz="1600" noProof="1"/>
+          </a:p>
+        </p:txBody>
+      </p:sp>
+      <p:cxnSp>
+        <p:nvCxnSpPr>
+          <p:cNvPr id="8" name="Straight Connector 7"/>
+          <p:cNvCxnSpPr/>
+          <p:nvPr/>
+        </p:nvCxnSpPr>
+        <p:spPr>
+          <a:xfrm>
+            <a:off x="2102272" y="1471919"/>
+            <a:ext cx="3599411" cy="0"/>
+          </a:xfrm>
+          <a:prstGeom prst="line">
+            <a:avLst/>
+          </a:prstGeom>
+          <a:ln>
+            <a:headEnd type="diamond"/>
+            <a:tailEnd type="diamond"/>
+          </a:ln>
+        </p:spPr>
+        <p:style>
+          <a:lnRef idx="1">
+            <a:schemeClr val="accent1"/>
+          </a:lnRef>
+          <a:fillRef idx="0">
+            <a:schemeClr val="accent1"/>
+          </a:fillRef>
+          <a:effectRef idx="0">
+            <a:schemeClr val="accent1"/>
+          </a:effectRef>
+          <a:fontRef idx="minor">
+            <a:schemeClr val="tx1"/>
+          </a:fontRef>
+        </p:style>
+      </p:cxnSp>
+      <p:sp>
+        <p:nvSpPr>
+          <p:cNvPr id="9" name="TextBox 8"/>
+          <p:cNvSpPr txBox="1"/>
+          <p:nvPr/>
+        </p:nvSpPr>
+        <p:spPr>
+          <a:xfrm>
+            <a:off x="1960956" y="1488540"/>
+            <a:ext cx="290945" cy="338554"/>
+          </a:xfrm>
+          <a:prstGeom prst="rect">
+            <a:avLst/>
+          </a:prstGeom>
+          <a:noFill/>
+        </p:spPr>
+        <p:txBody>
+          <a:bodyPr wrap="square" rtlCol="0">
+            <a:spAutoFit/>
+          </a:bodyPr>
+          <a:lstStyle/>
+          <a:p>
+            <a:r>
+              <a:rPr lang="en-GB" sz="1600" noProof="1" smtClean="0"/>
+              <a:t>0</a:t>
+            </a:r>
+            <a:endParaRPr lang="en-GB" sz="1600" noProof="1"/>
+          </a:p>
+        </p:txBody>
+      </p:sp>
+      <p:sp>
+        <p:nvSpPr>
+          <p:cNvPr id="10" name="TextBox 9"/>
+          <p:cNvSpPr txBox="1"/>
+          <p:nvPr/>
+        </p:nvSpPr>
+        <p:spPr>
+          <a:xfrm>
+            <a:off x="5473083" y="1496853"/>
+            <a:ext cx="619299" cy="338554"/>
+          </a:xfrm>
+          <a:prstGeom prst="rect">
+            <a:avLst/>
+          </a:prstGeom>
+          <a:noFill/>
+        </p:spPr>
+        <p:txBody>
+          <a:bodyPr wrap="square" rtlCol="0">
+            <a:spAutoFit/>
+          </a:bodyPr>
+          <a:lstStyle/>
+          <a:p>
+            <a:r>
+              <a:rPr lang="en-GB" sz="1600" noProof="1" smtClean="0"/>
+              <a:t>100</a:t>
+            </a:r>
+            <a:endParaRPr lang="en-GB" sz="1600" noProof="1"/>
+          </a:p>
+        </p:txBody>
+      </p:sp>
+      <p:cxnSp>
+        <p:nvCxnSpPr>
+          <p:cNvPr id="11" name="Straight Connector 10"/>
+          <p:cNvCxnSpPr/>
+          <p:nvPr/>
+        </p:nvCxnSpPr>
+        <p:spPr>
+          <a:xfrm>
+            <a:off x="2102272" y="1997673"/>
+            <a:ext cx="3599411" cy="0"/>
+          </a:xfrm>
+          <a:prstGeom prst="line">
+            <a:avLst/>
+          </a:prstGeom>
+          <a:ln>
+            <a:headEnd type="diamond"/>
+            <a:tailEnd type="diamond"/>
+          </a:ln>
+        </p:spPr>
+        <p:style>
+          <a:lnRef idx="1">
+            <a:schemeClr val="accent1"/>
+          </a:lnRef>
+          <a:fillRef idx="0">
+            <a:schemeClr val="accent1"/>
+          </a:fillRef>
+          <a:effectRef idx="0">
+            <a:schemeClr val="accent1"/>
+          </a:effectRef>
+          <a:fontRef idx="minor">
+            <a:schemeClr val="tx1"/>
+          </a:fontRef>
+        </p:style>
+      </p:cxnSp>
+      <p:sp>
+        <p:nvSpPr>
+          <p:cNvPr id="12" name="TextBox 11"/>
+          <p:cNvSpPr txBox="1"/>
+          <p:nvPr/>
+        </p:nvSpPr>
+        <p:spPr>
+          <a:xfrm>
+            <a:off x="1960956" y="2014294"/>
+            <a:ext cx="290945" cy="338554"/>
+          </a:xfrm>
+          <a:prstGeom prst="rect">
+            <a:avLst/>
+          </a:prstGeom>
+          <a:noFill/>
+        </p:spPr>
+        <p:txBody>
+          <a:bodyPr wrap="square" rtlCol="0">
+            <a:spAutoFit/>
+          </a:bodyPr>
+          <a:lstStyle/>
+          <a:p>
+            <a:r>
+              <a:rPr lang="en-GB" sz="1600" noProof="1" smtClean="0"/>
+              <a:t>0</a:t>
+            </a:r>
+            <a:endParaRPr lang="en-GB" sz="1600" noProof="1"/>
+          </a:p>
+        </p:txBody>
+      </p:sp>
+      <p:sp>
+        <p:nvSpPr>
+          <p:cNvPr id="13" name="TextBox 12"/>
+          <p:cNvSpPr txBox="1"/>
+          <p:nvPr/>
+        </p:nvSpPr>
+        <p:spPr>
+          <a:xfrm>
+            <a:off x="5473083" y="2022607"/>
+            <a:ext cx="619299" cy="338554"/>
+          </a:xfrm>
+          <a:prstGeom prst="rect">
+            <a:avLst/>
+          </a:prstGeom>
+          <a:noFill/>
+        </p:spPr>
+        <p:txBody>
+          <a:bodyPr wrap="square" rtlCol="0">
+            <a:spAutoFit/>
+          </a:bodyPr>
+          <a:lstStyle/>
+          <a:p>
+            <a:r>
+              <a:rPr lang="en-GB" sz="1600" noProof="1" smtClean="0"/>
+              <a:t>100</a:t>
+            </a:r>
+            <a:endParaRPr lang="en-GB" sz="1600" noProof="1"/>
+          </a:p>
+        </p:txBody>
+      </p:sp>
+      <p:sp>
+        <p:nvSpPr>
+          <p:cNvPr id="14" name="TextBox 13"/>
+          <p:cNvSpPr txBox="1"/>
+          <p:nvPr/>
+        </p:nvSpPr>
+        <p:spPr>
+          <a:xfrm>
+            <a:off x="3069772" y="980559"/>
+            <a:ext cx="1875453" cy="338554"/>
+          </a:xfrm>
+          <a:prstGeom prst="rect">
+            <a:avLst/>
+          </a:prstGeom>
+          <a:noFill/>
+        </p:spPr>
+        <p:txBody>
+          <a:bodyPr wrap="square" rtlCol="0">
+            <a:spAutoFit/>
+          </a:bodyPr>
+          <a:lstStyle/>
+          <a:p>
+            <a:r>
+              <a:rPr lang="en-GB" sz="1600" noProof="1" smtClean="0"/>
+              <a:t>P1 (awg)</a:t>
+            </a:r>
+            <a:endParaRPr lang="en-GB" sz="1600" noProof="1"/>
+          </a:p>
+        </p:txBody>
+      </p:sp>
+      <p:sp>
+        <p:nvSpPr>
+          <p:cNvPr id="15" name="TextBox 14"/>
+          <p:cNvSpPr txBox="1"/>
+          <p:nvPr/>
+        </p:nvSpPr>
+        <p:spPr>
+          <a:xfrm>
+            <a:off x="3069770" y="1496853"/>
+            <a:ext cx="1875453" cy="338554"/>
+          </a:xfrm>
+          <a:prstGeom prst="rect">
+            <a:avLst/>
+          </a:prstGeom>
+          <a:noFill/>
+        </p:spPr>
+        <p:txBody>
+          <a:bodyPr wrap="square" rtlCol="0">
+            <a:spAutoFit/>
+          </a:bodyPr>
+          <a:lstStyle/>
+          <a:p>
+            <a:r>
+              <a:rPr lang="en-GB" sz="1600" noProof="1" smtClean="0"/>
+              <a:t>P2 (awg)</a:t>
+            </a:r>
+            <a:endParaRPr lang="en-GB" sz="1600" noProof="1"/>
+          </a:p>
+        </p:txBody>
+      </p:sp>
+      <p:sp>
+        <p:nvSpPr>
+          <p:cNvPr id="16" name="TextBox 15"/>
+          <p:cNvSpPr txBox="1"/>
+          <p:nvPr/>
+        </p:nvSpPr>
+        <p:spPr>
+          <a:xfrm>
+            <a:off x="3069771" y="2021714"/>
+            <a:ext cx="1875453" cy="338554"/>
+          </a:xfrm>
+          <a:prstGeom prst="rect">
+            <a:avLst/>
+          </a:prstGeom>
+          <a:noFill/>
+        </p:spPr>
+        <p:txBody>
+          <a:bodyPr wrap="square" rtlCol="0">
+            <a:spAutoFit/>
+          </a:bodyPr>
+          <a:lstStyle/>
+          <a:p>
+            <a:r>
+              <a:rPr lang="en-GB" sz="1600" noProof="1" smtClean="0"/>
+              <a:t>SD1 (digitizer)</a:t>
+            </a:r>
+            <a:endParaRPr lang="en-GB" sz="1600" noProof="1"/>
+          </a:p>
+        </p:txBody>
+      </p:sp>
+      <p:cxnSp>
+        <p:nvCxnSpPr>
+          <p:cNvPr id="17" name="Straight Connector 16"/>
+          <p:cNvCxnSpPr/>
+          <p:nvPr/>
+        </p:nvCxnSpPr>
+        <p:spPr>
+          <a:xfrm>
+            <a:off x="2102272" y="3030133"/>
+            <a:ext cx="3599411" cy="0"/>
+          </a:xfrm>
+          <a:prstGeom prst="line">
+            <a:avLst/>
+          </a:prstGeom>
+          <a:ln>
+            <a:headEnd type="diamond"/>
+            <a:tailEnd type="diamond"/>
+          </a:ln>
+        </p:spPr>
+        <p:style>
+          <a:lnRef idx="1">
+            <a:schemeClr val="accent1"/>
+          </a:lnRef>
+          <a:fillRef idx="0">
+            <a:schemeClr val="accent1"/>
+          </a:fillRef>
+          <a:effectRef idx="0">
+            <a:schemeClr val="accent1"/>
+          </a:effectRef>
+          <a:fontRef idx="minor">
+            <a:schemeClr val="tx1"/>
+          </a:fontRef>
+        </p:style>
+      </p:cxnSp>
+      <p:sp>
+        <p:nvSpPr>
+          <p:cNvPr id="18" name="TextBox 17"/>
+          <p:cNvSpPr txBox="1"/>
+          <p:nvPr/>
+        </p:nvSpPr>
+        <p:spPr>
+          <a:xfrm>
+            <a:off x="1960956" y="3046754"/>
+            <a:ext cx="290945" cy="338554"/>
+          </a:xfrm>
+          <a:prstGeom prst="rect">
+            <a:avLst/>
+          </a:prstGeom>
+          <a:noFill/>
+        </p:spPr>
+        <p:txBody>
+          <a:bodyPr wrap="square" rtlCol="0">
+            <a:spAutoFit/>
+          </a:bodyPr>
+          <a:lstStyle/>
+          <a:p>
+            <a:r>
+              <a:rPr lang="en-GB" sz="1600" noProof="1" smtClean="0"/>
+              <a:t>0</a:t>
+            </a:r>
+            <a:endParaRPr lang="en-GB" sz="1600" noProof="1"/>
+          </a:p>
+        </p:txBody>
+      </p:sp>
+      <p:sp>
+        <p:nvSpPr>
+          <p:cNvPr id="19" name="TextBox 18"/>
+          <p:cNvSpPr txBox="1"/>
+          <p:nvPr/>
+        </p:nvSpPr>
+        <p:spPr>
+          <a:xfrm>
+            <a:off x="5473083" y="3055067"/>
+            <a:ext cx="619299" cy="338554"/>
+          </a:xfrm>
+          <a:prstGeom prst="rect">
+            <a:avLst/>
+          </a:prstGeom>
+          <a:noFill/>
+        </p:spPr>
+        <p:txBody>
+          <a:bodyPr wrap="square" rtlCol="0">
+            <a:spAutoFit/>
+          </a:bodyPr>
+          <a:lstStyle/>
+          <a:p>
+            <a:r>
+              <a:rPr lang="en-GB" sz="1600" noProof="1" smtClean="0"/>
+              <a:t>100</a:t>
+            </a:r>
+            <a:endParaRPr lang="en-GB" sz="1600" noProof="1"/>
+          </a:p>
+        </p:txBody>
+      </p:sp>
+      <p:cxnSp>
+        <p:nvCxnSpPr>
+          <p:cNvPr id="20" name="Straight Connector 19"/>
+          <p:cNvCxnSpPr/>
+          <p:nvPr/>
+        </p:nvCxnSpPr>
+        <p:spPr>
+          <a:xfrm>
+            <a:off x="1729032" y="3546427"/>
+            <a:ext cx="3599411" cy="0"/>
+          </a:xfrm>
+          <a:prstGeom prst="line">
+            <a:avLst/>
+          </a:prstGeom>
+          <a:ln>
+            <a:headEnd type="diamond"/>
+            <a:tailEnd type="diamond"/>
+          </a:ln>
+        </p:spPr>
+        <p:style>
+          <a:lnRef idx="1">
+            <a:schemeClr val="accent1"/>
+          </a:lnRef>
+          <a:fillRef idx="0">
+            <a:schemeClr val="accent1"/>
+          </a:fillRef>
+          <a:effectRef idx="0">
+            <a:schemeClr val="accent1"/>
+          </a:effectRef>
+          <a:fontRef idx="minor">
+            <a:schemeClr val="tx1"/>
+          </a:fontRef>
+        </p:style>
+      </p:cxnSp>
+      <p:sp>
+        <p:nvSpPr>
+          <p:cNvPr id="21" name="TextBox 20"/>
+          <p:cNvSpPr txBox="1"/>
+          <p:nvPr/>
+        </p:nvSpPr>
+        <p:spPr>
+          <a:xfrm>
+            <a:off x="1587716" y="3563048"/>
+            <a:ext cx="290945" cy="338554"/>
+          </a:xfrm>
+          <a:prstGeom prst="rect">
+            <a:avLst/>
+          </a:prstGeom>
+          <a:noFill/>
+        </p:spPr>
+        <p:txBody>
+          <a:bodyPr wrap="square" rtlCol="0">
+            <a:spAutoFit/>
+          </a:bodyPr>
+          <a:lstStyle/>
+          <a:p>
+            <a:r>
+              <a:rPr lang="en-GB" sz="1600" noProof="1" smtClean="0"/>
+              <a:t>0</a:t>
+            </a:r>
+            <a:endParaRPr lang="en-GB" sz="1600" noProof="1"/>
+          </a:p>
+        </p:txBody>
+      </p:sp>
+      <p:sp>
+        <p:nvSpPr>
+          <p:cNvPr id="22" name="TextBox 21"/>
+          <p:cNvSpPr txBox="1"/>
+          <p:nvPr/>
+        </p:nvSpPr>
+        <p:spPr>
+          <a:xfrm>
+            <a:off x="5099843" y="3571361"/>
+            <a:ext cx="619299" cy="338554"/>
+          </a:xfrm>
+          <a:prstGeom prst="rect">
+            <a:avLst/>
+          </a:prstGeom>
+          <a:noFill/>
+        </p:spPr>
+        <p:txBody>
+          <a:bodyPr wrap="square" rtlCol="0">
+            <a:spAutoFit/>
+          </a:bodyPr>
+          <a:lstStyle/>
+          <a:p>
+            <a:r>
+              <a:rPr lang="en-GB" sz="1600" noProof="1" smtClean="0"/>
+              <a:t>100</a:t>
+            </a:r>
+            <a:endParaRPr lang="en-GB" sz="1600" noProof="1"/>
+          </a:p>
+        </p:txBody>
+      </p:sp>
+      <p:cxnSp>
+        <p:nvCxnSpPr>
+          <p:cNvPr id="23" name="Straight Connector 22"/>
+          <p:cNvCxnSpPr/>
+          <p:nvPr/>
+        </p:nvCxnSpPr>
+        <p:spPr>
+          <a:xfrm>
+            <a:off x="2839421" y="4072181"/>
+            <a:ext cx="3599411" cy="0"/>
+          </a:xfrm>
+          <a:prstGeom prst="line">
+            <a:avLst/>
+          </a:prstGeom>
+          <a:ln>
+            <a:headEnd type="diamond"/>
+            <a:tailEnd type="diamond"/>
+          </a:ln>
+        </p:spPr>
+        <p:style>
+          <a:lnRef idx="1">
+            <a:schemeClr val="accent1"/>
+          </a:lnRef>
+          <a:fillRef idx="0">
+            <a:schemeClr val="accent1"/>
+          </a:fillRef>
+          <a:effectRef idx="0">
+            <a:schemeClr val="accent1"/>
+          </a:effectRef>
+          <a:fontRef idx="minor">
+            <a:schemeClr val="tx1"/>
+          </a:fontRef>
+        </p:style>
+      </p:cxnSp>
+      <p:sp>
+        <p:nvSpPr>
+          <p:cNvPr id="24" name="TextBox 23"/>
+          <p:cNvSpPr txBox="1"/>
+          <p:nvPr/>
+        </p:nvSpPr>
+        <p:spPr>
+          <a:xfrm>
+            <a:off x="2698105" y="4088802"/>
+            <a:ext cx="290945" cy="338554"/>
+          </a:xfrm>
+          <a:prstGeom prst="rect">
+            <a:avLst/>
+          </a:prstGeom>
+          <a:noFill/>
+        </p:spPr>
+        <p:txBody>
+          <a:bodyPr wrap="square" rtlCol="0">
+            <a:spAutoFit/>
+          </a:bodyPr>
+          <a:lstStyle/>
+          <a:p>
+            <a:r>
+              <a:rPr lang="en-GB" sz="1600" noProof="1" smtClean="0"/>
+              <a:t>0</a:t>
+            </a:r>
+            <a:endParaRPr lang="en-GB" sz="1600" noProof="1"/>
+          </a:p>
+        </p:txBody>
+      </p:sp>
+      <p:sp>
+        <p:nvSpPr>
+          <p:cNvPr id="25" name="TextBox 24"/>
+          <p:cNvSpPr txBox="1"/>
+          <p:nvPr/>
+        </p:nvSpPr>
+        <p:spPr>
+          <a:xfrm>
+            <a:off x="6210232" y="4097115"/>
+            <a:ext cx="619299" cy="338554"/>
+          </a:xfrm>
+          <a:prstGeom prst="rect">
+            <a:avLst/>
+          </a:prstGeom>
+          <a:noFill/>
+        </p:spPr>
+        <p:txBody>
+          <a:bodyPr wrap="square" rtlCol="0">
+            <a:spAutoFit/>
+          </a:bodyPr>
+          <a:lstStyle/>
+          <a:p>
+            <a:r>
+              <a:rPr lang="en-GB" sz="1600" noProof="1" smtClean="0"/>
+              <a:t>100</a:t>
+            </a:r>
+            <a:endParaRPr lang="en-GB" sz="1600" noProof="1"/>
+          </a:p>
+        </p:txBody>
+      </p:sp>
+      <p:sp>
+        <p:nvSpPr>
+          <p:cNvPr id="26" name="TextBox 25"/>
+          <p:cNvSpPr txBox="1"/>
+          <p:nvPr/>
+        </p:nvSpPr>
+        <p:spPr>
+          <a:xfrm>
+            <a:off x="3069772" y="3055067"/>
+            <a:ext cx="1875453" cy="338554"/>
+          </a:xfrm>
+          <a:prstGeom prst="rect">
+            <a:avLst/>
+          </a:prstGeom>
+          <a:noFill/>
+        </p:spPr>
+        <p:txBody>
+          <a:bodyPr wrap="square" rtlCol="0">
+            <a:spAutoFit/>
+          </a:bodyPr>
+          <a:lstStyle/>
+          <a:p>
+            <a:r>
+              <a:rPr lang="en-GB" sz="1600" noProof="1" smtClean="0"/>
+              <a:t>P1 (awg)</a:t>
+            </a:r>
+            <a:endParaRPr lang="en-GB" sz="1600" noProof="1"/>
+          </a:p>
+        </p:txBody>
+      </p:sp>
+      <p:sp>
+        <p:nvSpPr>
+          <p:cNvPr id="27" name="TextBox 26"/>
+          <p:cNvSpPr txBox="1"/>
+          <p:nvPr/>
+        </p:nvSpPr>
+        <p:spPr>
+          <a:xfrm>
+            <a:off x="2761847" y="3571361"/>
+            <a:ext cx="1875453" cy="338554"/>
+          </a:xfrm>
+          <a:prstGeom prst="rect">
+            <a:avLst/>
+          </a:prstGeom>
+          <a:noFill/>
+        </p:spPr>
+        <p:txBody>
+          <a:bodyPr wrap="square" rtlCol="0">
+            <a:spAutoFit/>
+          </a:bodyPr>
+          <a:lstStyle/>
+          <a:p>
+            <a:r>
+              <a:rPr lang="en-GB" sz="1600" noProof="1" smtClean="0"/>
+              <a:t>P2 (awg) delay = -10</a:t>
+            </a:r>
+            <a:endParaRPr lang="en-GB" sz="1600" noProof="1"/>
+          </a:p>
+        </p:txBody>
+      </p:sp>
+      <p:sp>
+        <p:nvSpPr>
+          <p:cNvPr id="28" name="TextBox 27"/>
+          <p:cNvSpPr txBox="1"/>
+          <p:nvPr/>
+        </p:nvSpPr>
+        <p:spPr>
+          <a:xfrm>
+            <a:off x="3408089" y="4096222"/>
+            <a:ext cx="2526183" cy="338554"/>
+          </a:xfrm>
+          <a:prstGeom prst="rect">
+            <a:avLst/>
+          </a:prstGeom>
+          <a:noFill/>
+        </p:spPr>
+        <p:txBody>
+          <a:bodyPr wrap="square" rtlCol="0">
+            <a:spAutoFit/>
+          </a:bodyPr>
+          <a:lstStyle/>
+          <a:p>
+            <a:r>
+              <a:rPr lang="en-GB" sz="1600" noProof="1" smtClean="0"/>
+              <a:t>SD1 (digitizer) delay = +20</a:t>
+            </a:r>
+            <a:endParaRPr lang="en-GB" sz="1600" noProof="1"/>
+          </a:p>
+        </p:txBody>
+      </p:sp>
+      <p:cxnSp>
+        <p:nvCxnSpPr>
+          <p:cNvPr id="31" name="Straight Connector 30"/>
+          <p:cNvCxnSpPr/>
+          <p:nvPr/>
+        </p:nvCxnSpPr>
+        <p:spPr>
+          <a:xfrm>
+            <a:off x="5701683" y="2892490"/>
+            <a:ext cx="0" cy="1791477"/>
+          </a:xfrm>
+          <a:prstGeom prst="line">
+            <a:avLst/>
+          </a:prstGeom>
+          <a:ln>
+            <a:solidFill>
+              <a:schemeClr val="accent2">
+                <a:lumMod val="75000"/>
+              </a:schemeClr>
+            </a:solidFill>
+            <a:prstDash val="dash"/>
+          </a:ln>
+        </p:spPr>
+        <p:style>
+          <a:lnRef idx="1">
+            <a:schemeClr val="accent1"/>
+          </a:lnRef>
+          <a:fillRef idx="0">
+            <a:schemeClr val="accent1"/>
+          </a:fillRef>
+          <a:effectRef idx="0">
+            <a:schemeClr val="accent1"/>
+          </a:effectRef>
+          <a:fontRef idx="minor">
+            <a:schemeClr val="tx1"/>
+          </a:fontRef>
+        </p:style>
+      </p:cxnSp>
+      <p:sp>
+        <p:nvSpPr>
+          <p:cNvPr id="32" name="Rectangle 31"/>
+          <p:cNvSpPr/>
+          <p:nvPr/>
+        </p:nvSpPr>
+        <p:spPr>
+          <a:xfrm>
+            <a:off x="8893744" y="6202671"/>
+            <a:ext cx="359941" cy="373224"/>
+          </a:xfrm>
+          <a:prstGeom prst="rect">
+            <a:avLst/>
+          </a:prstGeom>
+        </p:spPr>
+        <p:style>
+          <a:lnRef idx="2">
+            <a:schemeClr val="accent1">
+              <a:shade val="50000"/>
+            </a:schemeClr>
+          </a:lnRef>
+          <a:fillRef idx="1">
+            <a:schemeClr val="accent1"/>
+          </a:fillRef>
+          <a:effectRef idx="0">
+            <a:schemeClr val="accent1"/>
+          </a:effectRef>
+          <a:fontRef idx="minor">
+            <a:schemeClr val="lt1"/>
+          </a:fontRef>
+        </p:style>
+        <p:txBody>
+          <a:bodyPr rtlCol="0" anchor="ctr"/>
+          <a:lstStyle/>
+          <a:p>
+            <a:pPr algn="ctr"/>
+            <a:endParaRPr lang="en-US"/>
+          </a:p>
+        </p:txBody>
+      </p:sp>
+      <p:sp>
+        <p:nvSpPr>
+          <p:cNvPr id="33" name="Rectangle 32"/>
+          <p:cNvSpPr/>
+          <p:nvPr/>
+        </p:nvSpPr>
+        <p:spPr>
+          <a:xfrm>
+            <a:off x="8363113" y="6202671"/>
+            <a:ext cx="359941" cy="373224"/>
+          </a:xfrm>
+          <a:prstGeom prst="rect">
+            <a:avLst/>
+          </a:prstGeom>
+        </p:spPr>
+        <p:style>
+          <a:lnRef idx="2">
+            <a:schemeClr val="accent1">
+              <a:shade val="50000"/>
+            </a:schemeClr>
+          </a:lnRef>
+          <a:fillRef idx="1">
+            <a:schemeClr val="accent1"/>
+          </a:fillRef>
+          <a:effectRef idx="0">
+            <a:schemeClr val="accent1"/>
+          </a:effectRef>
+          <a:fontRef idx="minor">
+            <a:schemeClr val="lt1"/>
+          </a:fontRef>
+        </p:style>
+        <p:txBody>
+          <a:bodyPr rtlCol="0" anchor="ctr"/>
+          <a:lstStyle/>
+          <a:p>
+            <a:pPr algn="ctr"/>
+            <a:endParaRPr lang="en-US"/>
+          </a:p>
+        </p:txBody>
+      </p:sp>
+      <p:cxnSp>
+        <p:nvCxnSpPr>
+          <p:cNvPr id="36" name="Straight Connector 35"/>
+          <p:cNvCxnSpPr/>
+          <p:nvPr/>
+        </p:nvCxnSpPr>
+        <p:spPr>
+          <a:xfrm>
+            <a:off x="1729032" y="2892490"/>
+            <a:ext cx="0" cy="1791477"/>
+          </a:xfrm>
+          <a:prstGeom prst="line">
+            <a:avLst/>
+          </a:prstGeom>
+          <a:ln>
+            <a:solidFill>
+              <a:srgbClr val="00B050"/>
+            </a:solidFill>
+            <a:prstDash val="dash"/>
+          </a:ln>
+        </p:spPr>
+        <p:style>
+          <a:lnRef idx="1">
+            <a:schemeClr val="accent1"/>
+          </a:lnRef>
+          <a:fillRef idx="0">
+            <a:schemeClr val="accent1"/>
+          </a:fillRef>
+          <a:effectRef idx="0">
+            <a:schemeClr val="accent1"/>
+          </a:effectRef>
+          <a:fontRef idx="minor">
+            <a:schemeClr val="tx1"/>
+          </a:fontRef>
+        </p:style>
+      </p:cxnSp>
+      <p:cxnSp>
+        <p:nvCxnSpPr>
+          <p:cNvPr id="39" name="Straight Connector 38"/>
+          <p:cNvCxnSpPr/>
+          <p:nvPr/>
+        </p:nvCxnSpPr>
+        <p:spPr>
+          <a:xfrm>
+            <a:off x="6438832" y="2892490"/>
+            <a:ext cx="0" cy="1763485"/>
+          </a:xfrm>
+          <a:prstGeom prst="line">
+            <a:avLst/>
+          </a:prstGeom>
+          <a:ln>
+            <a:solidFill>
+              <a:srgbClr val="00B050"/>
+            </a:solidFill>
+            <a:prstDash val="dash"/>
+          </a:ln>
+        </p:spPr>
+        <p:style>
+          <a:lnRef idx="1">
+            <a:schemeClr val="accent1"/>
+          </a:lnRef>
+          <a:fillRef idx="0">
+            <a:schemeClr val="accent1"/>
+          </a:fillRef>
+          <a:effectRef idx="0">
+            <a:schemeClr val="accent1"/>
+          </a:effectRef>
+          <a:fontRef idx="minor">
+            <a:schemeClr val="tx1"/>
+          </a:fontRef>
+        </p:style>
+      </p:cxnSp>
+      <p:sp>
+        <p:nvSpPr>
+          <p:cNvPr id="40" name="TextBox 39"/>
+          <p:cNvSpPr txBox="1"/>
+          <p:nvPr/>
+        </p:nvSpPr>
+        <p:spPr>
+          <a:xfrm>
+            <a:off x="2902455" y="4665385"/>
+            <a:ext cx="1120172" cy="338554"/>
+          </a:xfrm>
+          <a:prstGeom prst="rect">
+            <a:avLst/>
+          </a:prstGeom>
+          <a:noFill/>
+        </p:spPr>
+        <p:txBody>
+          <a:bodyPr wrap="square" rtlCol="0">
+            <a:spAutoFit/>
+          </a:bodyPr>
+          <a:lstStyle/>
+          <a:p>
+            <a:r>
+              <a:rPr lang="en-GB" sz="1600" i="1" noProof="1" smtClean="0">
+                <a:solidFill>
+                  <a:srgbClr val="00B050"/>
+                </a:solidFill>
+              </a:rPr>
+              <a:t>samples</a:t>
+            </a:r>
+            <a:endParaRPr lang="en-GB" sz="1600" i="1" noProof="1">
+              <a:solidFill>
+                <a:srgbClr val="00B050"/>
+              </a:solidFill>
+            </a:endParaRPr>
+          </a:p>
+        </p:txBody>
+      </p:sp>
+      <p:sp>
+        <p:nvSpPr>
+          <p:cNvPr id="41" name="TextBox 40"/>
+          <p:cNvSpPr txBox="1"/>
+          <p:nvPr/>
+        </p:nvSpPr>
+        <p:spPr>
+          <a:xfrm>
+            <a:off x="1578153" y="4665385"/>
+            <a:ext cx="329215" cy="338554"/>
+          </a:xfrm>
+          <a:prstGeom prst="rect">
+            <a:avLst/>
+          </a:prstGeom>
+          <a:noFill/>
+        </p:spPr>
+        <p:txBody>
+          <a:bodyPr wrap="square" rtlCol="0">
+            <a:spAutoFit/>
+          </a:bodyPr>
+          <a:lstStyle/>
+          <a:p>
+            <a:r>
+              <a:rPr lang="en-GB" sz="1600" i="1" noProof="1" smtClean="0">
+                <a:solidFill>
+                  <a:srgbClr val="00B050"/>
+                </a:solidFill>
+              </a:rPr>
+              <a:t>0</a:t>
+            </a:r>
+            <a:endParaRPr lang="en-GB" sz="1600" i="1" noProof="1">
+              <a:solidFill>
+                <a:srgbClr val="00B050"/>
+              </a:solidFill>
+            </a:endParaRPr>
+          </a:p>
+        </p:txBody>
+      </p:sp>
+      <p:sp>
+        <p:nvSpPr>
+          <p:cNvPr id="42" name="TextBox 41"/>
+          <p:cNvSpPr txBox="1"/>
+          <p:nvPr/>
+        </p:nvSpPr>
+        <p:spPr>
+          <a:xfrm>
+            <a:off x="1929640" y="4665385"/>
+            <a:ext cx="436273" cy="338554"/>
+          </a:xfrm>
+          <a:prstGeom prst="rect">
+            <a:avLst/>
+          </a:prstGeom>
+          <a:noFill/>
+        </p:spPr>
+        <p:txBody>
+          <a:bodyPr wrap="square" rtlCol="0">
+            <a:spAutoFit/>
+          </a:bodyPr>
+          <a:lstStyle/>
+          <a:p>
+            <a:r>
+              <a:rPr lang="en-GB" sz="1600" i="1" noProof="1" smtClean="0">
+                <a:solidFill>
+                  <a:srgbClr val="00B050"/>
+                </a:solidFill>
+              </a:rPr>
+              <a:t>10</a:t>
+            </a:r>
+            <a:endParaRPr lang="en-GB" sz="1600" i="1" noProof="1">
+              <a:solidFill>
+                <a:srgbClr val="00B050"/>
+              </a:solidFill>
+            </a:endParaRPr>
+          </a:p>
+        </p:txBody>
+      </p:sp>
+      <p:sp>
+        <p:nvSpPr>
+          <p:cNvPr id="43" name="TextBox 42"/>
+          <p:cNvSpPr txBox="1"/>
+          <p:nvPr/>
+        </p:nvSpPr>
+        <p:spPr>
+          <a:xfrm>
+            <a:off x="5461822" y="4661630"/>
+            <a:ext cx="586312" cy="338554"/>
+          </a:xfrm>
+          <a:prstGeom prst="rect">
+            <a:avLst/>
+          </a:prstGeom>
+          <a:noFill/>
+        </p:spPr>
+        <p:txBody>
+          <a:bodyPr wrap="square" rtlCol="0">
+            <a:spAutoFit/>
+          </a:bodyPr>
+          <a:lstStyle/>
+          <a:p>
+            <a:r>
+              <a:rPr lang="en-GB" sz="1600" i="1" noProof="1" smtClean="0">
+                <a:solidFill>
+                  <a:srgbClr val="00B050"/>
+                </a:solidFill>
+              </a:rPr>
+              <a:t>110</a:t>
+            </a:r>
+            <a:endParaRPr lang="en-GB" sz="1600" i="1" noProof="1">
+              <a:solidFill>
+                <a:srgbClr val="00B050"/>
+              </a:solidFill>
+            </a:endParaRPr>
+          </a:p>
+        </p:txBody>
+      </p:sp>
+      <p:sp>
+        <p:nvSpPr>
+          <p:cNvPr id="44" name="TextBox 43"/>
+          <p:cNvSpPr txBox="1"/>
+          <p:nvPr/>
+        </p:nvSpPr>
+        <p:spPr>
+          <a:xfrm>
+            <a:off x="6176892" y="4661630"/>
+            <a:ext cx="586312" cy="338554"/>
+          </a:xfrm>
+          <a:prstGeom prst="rect">
+            <a:avLst/>
+          </a:prstGeom>
+          <a:noFill/>
+        </p:spPr>
+        <p:txBody>
+          <a:bodyPr wrap="square" rtlCol="0">
+            <a:spAutoFit/>
+          </a:bodyPr>
+          <a:lstStyle/>
+          <a:p>
+            <a:r>
+              <a:rPr lang="en-GB" sz="1600" i="1" noProof="1" smtClean="0">
+                <a:solidFill>
+                  <a:srgbClr val="00B050"/>
+                </a:solidFill>
+              </a:rPr>
+              <a:t>130</a:t>
+            </a:r>
+            <a:endParaRPr lang="en-GB" sz="1600" i="1" noProof="1">
+              <a:solidFill>
+                <a:srgbClr val="00B050"/>
+              </a:solidFill>
+            </a:endParaRPr>
+          </a:p>
+        </p:txBody>
+      </p:sp>
+      <p:cxnSp>
+        <p:nvCxnSpPr>
+          <p:cNvPr id="55" name="Straight Connector 54"/>
+          <p:cNvCxnSpPr/>
+          <p:nvPr/>
+        </p:nvCxnSpPr>
+        <p:spPr>
+          <a:xfrm>
+            <a:off x="5695461" y="796210"/>
+            <a:ext cx="0" cy="1629748"/>
+          </a:xfrm>
+          <a:prstGeom prst="line">
+            <a:avLst/>
+          </a:prstGeom>
+          <a:ln>
+            <a:solidFill>
+              <a:schemeClr val="accent2">
+                <a:lumMod val="75000"/>
+              </a:schemeClr>
+            </a:solidFill>
+            <a:prstDash val="dash"/>
+          </a:ln>
+        </p:spPr>
+        <p:style>
+          <a:lnRef idx="1">
+            <a:schemeClr val="accent1"/>
+          </a:lnRef>
+          <a:fillRef idx="0">
+            <a:schemeClr val="accent1"/>
+          </a:fillRef>
+          <a:effectRef idx="0">
+            <a:schemeClr val="accent1"/>
+          </a:effectRef>
+          <a:fontRef idx="minor">
+            <a:schemeClr val="tx1"/>
+          </a:fontRef>
+        </p:style>
+      </p:cxnSp>
+      <p:cxnSp>
+        <p:nvCxnSpPr>
+          <p:cNvPr id="60" name="Straight Connector 59"/>
+          <p:cNvCxnSpPr/>
+          <p:nvPr/>
+        </p:nvCxnSpPr>
+        <p:spPr>
+          <a:xfrm>
+            <a:off x="2102272" y="796210"/>
+            <a:ext cx="0" cy="1629748"/>
+          </a:xfrm>
+          <a:prstGeom prst="line">
+            <a:avLst/>
+          </a:prstGeom>
+          <a:ln>
+            <a:solidFill>
+              <a:schemeClr val="accent2">
+                <a:lumMod val="75000"/>
+              </a:schemeClr>
+            </a:solidFill>
+            <a:prstDash val="dash"/>
+          </a:ln>
+        </p:spPr>
+        <p:style>
+          <a:lnRef idx="1">
+            <a:schemeClr val="accent1"/>
+          </a:lnRef>
+          <a:fillRef idx="0">
+            <a:schemeClr val="accent1"/>
+          </a:fillRef>
+          <a:effectRef idx="0">
+            <a:schemeClr val="accent1"/>
+          </a:effectRef>
+          <a:fontRef idx="minor">
+            <a:schemeClr val="tx1"/>
+          </a:fontRef>
+        </p:style>
+      </p:cxnSp>
+    </p:spTree>
+    <p:extLst>
+      <p:ext uri="{BB962C8B-B14F-4D97-AF65-F5344CB8AC3E}">
+        <p14:creationId xmlns:p14="http://schemas.microsoft.com/office/powerpoint/2010/main" val="2989870598"/>
+      </p:ext>
+    </p:extLst>
+  </p:cSld>
+  <p:clrMapOvr>
+    <a:masterClrMapping/>
+  </p:clrMapOvr>
+</p:sld>
+</file>
+
+<file path=ppt/slides/slide6.xml><?xml version="1.0" encoding="utf-8"?>
+<p:sld xmlns:a="http://schemas.openxmlformats.org/drawingml/2006/main" xmlns:r="http://schemas.openxmlformats.org/officeDocument/2006/relationships" xmlns:p="http://schemas.openxmlformats.org/presentationml/2006/main">
+  <p:cSld>
+    <p:spTree>
+      <p:nvGrpSpPr>
+        <p:cNvPr id="1" name=""/>
+        <p:cNvGrpSpPr/>
+        <p:nvPr/>
+      </p:nvGrpSpPr>
+      <p:grpSpPr>
+        <a:xfrm>
+          <a:off x="0" y="0"/>
+          <a:ext cx="0" cy="0"/>
+          <a:chOff x="0" y="0"/>
+          <a:chExt cx="0" cy="0"/>
+        </a:xfrm>
+      </p:grpSpPr>
+      <p:cxnSp>
+        <p:nvCxnSpPr>
+          <p:cNvPr id="30" name="Straight Connector 29"/>
+          <p:cNvCxnSpPr/>
+          <p:nvPr/>
+        </p:nvCxnSpPr>
+        <p:spPr>
+          <a:xfrm>
+            <a:off x="2102605" y="2244089"/>
+            <a:ext cx="0" cy="1791477"/>
+          </a:xfrm>
+          <a:prstGeom prst="line">
+            <a:avLst/>
+          </a:prstGeom>
+          <a:ln>
+            <a:solidFill>
+              <a:schemeClr val="accent2">
+                <a:lumMod val="75000"/>
+              </a:schemeClr>
+            </a:solidFill>
+            <a:prstDash val="dash"/>
+          </a:ln>
+        </p:spPr>
+        <p:style>
+          <a:lnRef idx="1">
+            <a:schemeClr val="accent1"/>
+          </a:lnRef>
+          <a:fillRef idx="0">
+            <a:schemeClr val="accent1"/>
+          </a:fillRef>
+          <a:effectRef idx="0">
+            <a:schemeClr val="accent1"/>
+          </a:effectRef>
+          <a:fontRef idx="minor">
+            <a:schemeClr val="tx1"/>
+          </a:fontRef>
+        </p:style>
+      </p:cxnSp>
+      <p:cxnSp>
+        <p:nvCxnSpPr>
+          <p:cNvPr id="5" name="Straight Connector 4"/>
+          <p:cNvCxnSpPr/>
+          <p:nvPr/>
+        </p:nvCxnSpPr>
+        <p:spPr>
+          <a:xfrm>
+            <a:off x="2102272" y="440232"/>
+            <a:ext cx="3599411" cy="0"/>
+          </a:xfrm>
+          <a:prstGeom prst="line">
+            <a:avLst/>
+          </a:prstGeom>
+          <a:ln>
+            <a:headEnd type="diamond"/>
+            <a:tailEnd type="diamond"/>
+          </a:ln>
+        </p:spPr>
+        <p:style>
+          <a:lnRef idx="1">
+            <a:schemeClr val="accent1"/>
+          </a:lnRef>
+          <a:fillRef idx="0">
+            <a:schemeClr val="accent1"/>
+          </a:fillRef>
+          <a:effectRef idx="0">
+            <a:schemeClr val="accent1"/>
+          </a:effectRef>
+          <a:fontRef idx="minor">
+            <a:schemeClr val="tx1"/>
+          </a:fontRef>
+        </p:style>
+      </p:cxnSp>
+      <p:sp>
+        <p:nvSpPr>
+          <p:cNvPr id="6" name="TextBox 5"/>
+          <p:cNvSpPr txBox="1"/>
+          <p:nvPr/>
+        </p:nvSpPr>
+        <p:spPr>
+          <a:xfrm>
+            <a:off x="1960956" y="456853"/>
+            <a:ext cx="290945" cy="338554"/>
+          </a:xfrm>
+          <a:prstGeom prst="rect">
+            <a:avLst/>
+          </a:prstGeom>
+          <a:noFill/>
+        </p:spPr>
+        <p:txBody>
+          <a:bodyPr wrap="square" rtlCol="0">
+            <a:spAutoFit/>
+          </a:bodyPr>
+          <a:lstStyle/>
+          <a:p>
+            <a:r>
+              <a:rPr lang="en-GB" sz="1600" noProof="1" smtClean="0"/>
+              <a:t>0</a:t>
+            </a:r>
+            <a:endParaRPr lang="en-GB" sz="1600" noProof="1"/>
+          </a:p>
+        </p:txBody>
+      </p:sp>
+      <p:sp>
+        <p:nvSpPr>
+          <p:cNvPr id="7" name="TextBox 6"/>
+          <p:cNvSpPr txBox="1"/>
+          <p:nvPr/>
+        </p:nvSpPr>
+        <p:spPr>
+          <a:xfrm>
+            <a:off x="5473083" y="465166"/>
+            <a:ext cx="619299" cy="338554"/>
+          </a:xfrm>
+          <a:prstGeom prst="rect">
+            <a:avLst/>
+          </a:prstGeom>
+          <a:noFill/>
+        </p:spPr>
+        <p:txBody>
+          <a:bodyPr wrap="square" rtlCol="0">
+            <a:spAutoFit/>
+          </a:bodyPr>
+          <a:lstStyle/>
+          <a:p>
+            <a:r>
+              <a:rPr lang="en-GB" sz="1600" noProof="1" smtClean="0"/>
+              <a:t>100</a:t>
+            </a:r>
+            <a:endParaRPr lang="en-GB" sz="1600" noProof="1"/>
+          </a:p>
+        </p:txBody>
+      </p:sp>
+      <p:cxnSp>
+        <p:nvCxnSpPr>
+          <p:cNvPr id="8" name="Straight Connector 7"/>
+          <p:cNvCxnSpPr/>
+          <p:nvPr/>
+        </p:nvCxnSpPr>
+        <p:spPr>
+          <a:xfrm>
+            <a:off x="2102272" y="956526"/>
+            <a:ext cx="3599411" cy="0"/>
+          </a:xfrm>
+          <a:prstGeom prst="line">
+            <a:avLst/>
+          </a:prstGeom>
+          <a:ln>
+            <a:headEnd type="diamond"/>
+            <a:tailEnd type="diamond"/>
+          </a:ln>
+        </p:spPr>
+        <p:style>
+          <a:lnRef idx="1">
+            <a:schemeClr val="accent1"/>
+          </a:lnRef>
+          <a:fillRef idx="0">
+            <a:schemeClr val="accent1"/>
+          </a:fillRef>
+          <a:effectRef idx="0">
+            <a:schemeClr val="accent1"/>
+          </a:effectRef>
+          <a:fontRef idx="minor">
+            <a:schemeClr val="tx1"/>
+          </a:fontRef>
+        </p:style>
+      </p:cxnSp>
+      <p:sp>
+        <p:nvSpPr>
+          <p:cNvPr id="9" name="TextBox 8"/>
+          <p:cNvSpPr txBox="1"/>
+          <p:nvPr/>
+        </p:nvSpPr>
+        <p:spPr>
+          <a:xfrm>
+            <a:off x="1960956" y="973147"/>
+            <a:ext cx="290945" cy="338554"/>
+          </a:xfrm>
+          <a:prstGeom prst="rect">
+            <a:avLst/>
+          </a:prstGeom>
+          <a:noFill/>
+        </p:spPr>
+        <p:txBody>
+          <a:bodyPr wrap="square" rtlCol="0">
+            <a:spAutoFit/>
+          </a:bodyPr>
+          <a:lstStyle/>
+          <a:p>
+            <a:r>
+              <a:rPr lang="en-GB" sz="1600" noProof="1" smtClean="0"/>
+              <a:t>0</a:t>
+            </a:r>
+            <a:endParaRPr lang="en-GB" sz="1600" noProof="1"/>
+          </a:p>
+        </p:txBody>
+      </p:sp>
+      <p:sp>
+        <p:nvSpPr>
+          <p:cNvPr id="10" name="TextBox 9"/>
+          <p:cNvSpPr txBox="1"/>
+          <p:nvPr/>
+        </p:nvSpPr>
+        <p:spPr>
+          <a:xfrm>
+            <a:off x="5473083" y="981460"/>
+            <a:ext cx="619299" cy="338554"/>
+          </a:xfrm>
+          <a:prstGeom prst="rect">
+            <a:avLst/>
+          </a:prstGeom>
+          <a:noFill/>
+        </p:spPr>
+        <p:txBody>
+          <a:bodyPr wrap="square" rtlCol="0">
+            <a:spAutoFit/>
+          </a:bodyPr>
+          <a:lstStyle/>
+          <a:p>
+            <a:r>
+              <a:rPr lang="en-GB" sz="1600" noProof="1" smtClean="0"/>
+              <a:t>100</a:t>
+            </a:r>
+            <a:endParaRPr lang="en-GB" sz="1600" noProof="1"/>
+          </a:p>
+        </p:txBody>
+      </p:sp>
+      <p:cxnSp>
+        <p:nvCxnSpPr>
+          <p:cNvPr id="11" name="Straight Connector 10"/>
+          <p:cNvCxnSpPr/>
+          <p:nvPr/>
+        </p:nvCxnSpPr>
+        <p:spPr>
+          <a:xfrm>
+            <a:off x="2102272" y="1482280"/>
+            <a:ext cx="3599411" cy="0"/>
+          </a:xfrm>
+          <a:prstGeom prst="line">
+            <a:avLst/>
+          </a:prstGeom>
+          <a:ln>
+            <a:headEnd type="diamond"/>
+            <a:tailEnd type="diamond"/>
+          </a:ln>
+        </p:spPr>
+        <p:style>
+          <a:lnRef idx="1">
+            <a:schemeClr val="accent1"/>
+          </a:lnRef>
+          <a:fillRef idx="0">
+            <a:schemeClr val="accent1"/>
+          </a:fillRef>
+          <a:effectRef idx="0">
+            <a:schemeClr val="accent1"/>
+          </a:effectRef>
+          <a:fontRef idx="minor">
+            <a:schemeClr val="tx1"/>
+          </a:fontRef>
+        </p:style>
+      </p:cxnSp>
+      <p:sp>
+        <p:nvSpPr>
+          <p:cNvPr id="12" name="TextBox 11"/>
+          <p:cNvSpPr txBox="1"/>
+          <p:nvPr/>
+        </p:nvSpPr>
+        <p:spPr>
+          <a:xfrm>
+            <a:off x="1960956" y="1498901"/>
+            <a:ext cx="290945" cy="338554"/>
+          </a:xfrm>
+          <a:prstGeom prst="rect">
+            <a:avLst/>
+          </a:prstGeom>
+          <a:noFill/>
+        </p:spPr>
+        <p:txBody>
+          <a:bodyPr wrap="square" rtlCol="0">
+            <a:spAutoFit/>
+          </a:bodyPr>
+          <a:lstStyle/>
+          <a:p>
+            <a:r>
+              <a:rPr lang="en-GB" sz="1600" noProof="1" smtClean="0"/>
+              <a:t>0</a:t>
+            </a:r>
+            <a:endParaRPr lang="en-GB" sz="1600" noProof="1"/>
+          </a:p>
+        </p:txBody>
+      </p:sp>
+      <p:sp>
+        <p:nvSpPr>
+          <p:cNvPr id="13" name="TextBox 12"/>
+          <p:cNvSpPr txBox="1"/>
+          <p:nvPr/>
+        </p:nvSpPr>
+        <p:spPr>
+          <a:xfrm>
+            <a:off x="5473083" y="1507214"/>
+            <a:ext cx="619299" cy="338554"/>
+          </a:xfrm>
+          <a:prstGeom prst="rect">
+            <a:avLst/>
+          </a:prstGeom>
+          <a:noFill/>
+        </p:spPr>
+        <p:txBody>
+          <a:bodyPr wrap="square" rtlCol="0">
+            <a:spAutoFit/>
+          </a:bodyPr>
+          <a:lstStyle/>
+          <a:p>
+            <a:r>
+              <a:rPr lang="en-GB" sz="1600" noProof="1" smtClean="0"/>
+              <a:t>100</a:t>
+            </a:r>
+            <a:endParaRPr lang="en-GB" sz="1600" noProof="1"/>
+          </a:p>
+        </p:txBody>
+      </p:sp>
+      <p:sp>
+        <p:nvSpPr>
+          <p:cNvPr id="14" name="TextBox 13"/>
+          <p:cNvSpPr txBox="1"/>
+          <p:nvPr/>
+        </p:nvSpPr>
+        <p:spPr>
+          <a:xfrm>
+            <a:off x="3069772" y="465166"/>
+            <a:ext cx="1875453" cy="338554"/>
+          </a:xfrm>
+          <a:prstGeom prst="rect">
+            <a:avLst/>
+          </a:prstGeom>
+          <a:noFill/>
+        </p:spPr>
+        <p:txBody>
+          <a:bodyPr wrap="square" rtlCol="0">
+            <a:spAutoFit/>
+          </a:bodyPr>
+          <a:lstStyle/>
+          <a:p>
+            <a:r>
+              <a:rPr lang="en-GB" sz="1600" noProof="1" smtClean="0"/>
+              <a:t>P1 (awg)</a:t>
+            </a:r>
+            <a:endParaRPr lang="en-GB" sz="1600" noProof="1"/>
+          </a:p>
+        </p:txBody>
+      </p:sp>
+      <p:sp>
+        <p:nvSpPr>
+          <p:cNvPr id="15" name="TextBox 14"/>
+          <p:cNvSpPr txBox="1"/>
+          <p:nvPr/>
+        </p:nvSpPr>
+        <p:spPr>
+          <a:xfrm>
+            <a:off x="3069770" y="981460"/>
+            <a:ext cx="1875453" cy="338554"/>
+          </a:xfrm>
+          <a:prstGeom prst="rect">
+            <a:avLst/>
+          </a:prstGeom>
+          <a:noFill/>
+        </p:spPr>
+        <p:txBody>
+          <a:bodyPr wrap="square" rtlCol="0">
+            <a:spAutoFit/>
+          </a:bodyPr>
+          <a:lstStyle/>
+          <a:p>
+            <a:r>
+              <a:rPr lang="en-GB" sz="1600" noProof="1" smtClean="0"/>
+              <a:t>P2 (awg)</a:t>
+            </a:r>
+            <a:endParaRPr lang="en-GB" sz="1600" noProof="1"/>
+          </a:p>
+        </p:txBody>
+      </p:sp>
+      <p:sp>
+        <p:nvSpPr>
+          <p:cNvPr id="16" name="TextBox 15"/>
+          <p:cNvSpPr txBox="1"/>
+          <p:nvPr/>
+        </p:nvSpPr>
+        <p:spPr>
+          <a:xfrm>
+            <a:off x="3069771" y="1506321"/>
+            <a:ext cx="1875453" cy="338554"/>
+          </a:xfrm>
+          <a:prstGeom prst="rect">
+            <a:avLst/>
+          </a:prstGeom>
+          <a:noFill/>
+        </p:spPr>
+        <p:txBody>
+          <a:bodyPr wrap="square" rtlCol="0">
+            <a:spAutoFit/>
+          </a:bodyPr>
+          <a:lstStyle/>
+          <a:p>
+            <a:r>
+              <a:rPr lang="en-GB" sz="1600" noProof="1" smtClean="0"/>
+              <a:t>SD1 (digitizer)</a:t>
+            </a:r>
+            <a:endParaRPr lang="en-GB" sz="1600" noProof="1"/>
+          </a:p>
+        </p:txBody>
+      </p:sp>
+      <p:cxnSp>
+        <p:nvCxnSpPr>
+          <p:cNvPr id="17" name="Straight Connector 16"/>
+          <p:cNvCxnSpPr/>
+          <p:nvPr/>
+        </p:nvCxnSpPr>
+        <p:spPr>
+          <a:xfrm>
+            <a:off x="2102272" y="2381732"/>
+            <a:ext cx="3599411" cy="0"/>
+          </a:xfrm>
+          <a:prstGeom prst="line">
+            <a:avLst/>
+          </a:prstGeom>
+          <a:ln>
+            <a:headEnd type="diamond"/>
+            <a:tailEnd type="diamond"/>
+          </a:ln>
+        </p:spPr>
+        <p:style>
+          <a:lnRef idx="1">
+            <a:schemeClr val="accent1"/>
+          </a:lnRef>
+          <a:fillRef idx="0">
+            <a:schemeClr val="accent1"/>
+          </a:fillRef>
+          <a:effectRef idx="0">
+            <a:schemeClr val="accent1"/>
+          </a:effectRef>
+          <a:fontRef idx="minor">
+            <a:schemeClr val="tx1"/>
+          </a:fontRef>
+        </p:style>
+      </p:cxnSp>
+      <p:sp>
+        <p:nvSpPr>
+          <p:cNvPr id="18" name="TextBox 17"/>
+          <p:cNvSpPr txBox="1"/>
+          <p:nvPr/>
+        </p:nvSpPr>
+        <p:spPr>
+          <a:xfrm>
+            <a:off x="1960956" y="2398353"/>
+            <a:ext cx="290945" cy="338554"/>
+          </a:xfrm>
+          <a:prstGeom prst="rect">
+            <a:avLst/>
+          </a:prstGeom>
+          <a:noFill/>
+        </p:spPr>
+        <p:txBody>
+          <a:bodyPr wrap="square" rtlCol="0">
+            <a:spAutoFit/>
+          </a:bodyPr>
+          <a:lstStyle/>
+          <a:p>
+            <a:r>
+              <a:rPr lang="en-GB" sz="1600" noProof="1" smtClean="0"/>
+              <a:t>0</a:t>
+            </a:r>
+            <a:endParaRPr lang="en-GB" sz="1600" noProof="1"/>
+          </a:p>
+        </p:txBody>
+      </p:sp>
+      <p:sp>
+        <p:nvSpPr>
+          <p:cNvPr id="19" name="TextBox 18"/>
+          <p:cNvSpPr txBox="1"/>
+          <p:nvPr/>
+        </p:nvSpPr>
+        <p:spPr>
+          <a:xfrm>
+            <a:off x="5473083" y="2406666"/>
+            <a:ext cx="619299" cy="338554"/>
+          </a:xfrm>
+          <a:prstGeom prst="rect">
+            <a:avLst/>
+          </a:prstGeom>
+          <a:noFill/>
+        </p:spPr>
+        <p:txBody>
+          <a:bodyPr wrap="square" rtlCol="0">
+            <a:spAutoFit/>
+          </a:bodyPr>
+          <a:lstStyle/>
+          <a:p>
+            <a:r>
+              <a:rPr lang="en-GB" sz="1600" noProof="1" smtClean="0"/>
+              <a:t>100</a:t>
+            </a:r>
+            <a:endParaRPr lang="en-GB" sz="1600" noProof="1"/>
+          </a:p>
+        </p:txBody>
+      </p:sp>
+      <p:cxnSp>
+        <p:nvCxnSpPr>
+          <p:cNvPr id="20" name="Straight Connector 19"/>
+          <p:cNvCxnSpPr/>
+          <p:nvPr/>
+        </p:nvCxnSpPr>
+        <p:spPr>
+          <a:xfrm>
+            <a:off x="1729032" y="2898026"/>
+            <a:ext cx="3599411" cy="0"/>
+          </a:xfrm>
+          <a:prstGeom prst="line">
+            <a:avLst/>
+          </a:prstGeom>
+          <a:ln>
+            <a:headEnd type="diamond"/>
+            <a:tailEnd type="diamond"/>
+          </a:ln>
+        </p:spPr>
+        <p:style>
+          <a:lnRef idx="1">
+            <a:schemeClr val="accent1"/>
+          </a:lnRef>
+          <a:fillRef idx="0">
+            <a:schemeClr val="accent1"/>
+          </a:fillRef>
+          <a:effectRef idx="0">
+            <a:schemeClr val="accent1"/>
+          </a:effectRef>
+          <a:fontRef idx="minor">
+            <a:schemeClr val="tx1"/>
+          </a:fontRef>
+        </p:style>
+      </p:cxnSp>
+      <p:sp>
+        <p:nvSpPr>
+          <p:cNvPr id="21" name="TextBox 20"/>
+          <p:cNvSpPr txBox="1"/>
+          <p:nvPr/>
+        </p:nvSpPr>
+        <p:spPr>
+          <a:xfrm>
+            <a:off x="1587716" y="2914647"/>
+            <a:ext cx="290945" cy="338554"/>
+          </a:xfrm>
+          <a:prstGeom prst="rect">
+            <a:avLst/>
+          </a:prstGeom>
+          <a:noFill/>
+        </p:spPr>
+        <p:txBody>
+          <a:bodyPr wrap="square" rtlCol="0">
+            <a:spAutoFit/>
+          </a:bodyPr>
+          <a:lstStyle/>
+          <a:p>
+            <a:r>
+              <a:rPr lang="en-GB" sz="1600" noProof="1" smtClean="0"/>
+              <a:t>0</a:t>
+            </a:r>
+            <a:endParaRPr lang="en-GB" sz="1600" noProof="1"/>
+          </a:p>
+        </p:txBody>
+      </p:sp>
+      <p:sp>
+        <p:nvSpPr>
+          <p:cNvPr id="22" name="TextBox 21"/>
+          <p:cNvSpPr txBox="1"/>
+          <p:nvPr/>
+        </p:nvSpPr>
+        <p:spPr>
+          <a:xfrm>
+            <a:off x="5099843" y="2922960"/>
+            <a:ext cx="619299" cy="338554"/>
+          </a:xfrm>
+          <a:prstGeom prst="rect">
+            <a:avLst/>
+          </a:prstGeom>
+          <a:noFill/>
+        </p:spPr>
+        <p:txBody>
+          <a:bodyPr wrap="square" rtlCol="0">
+            <a:spAutoFit/>
+          </a:bodyPr>
+          <a:lstStyle/>
+          <a:p>
+            <a:r>
+              <a:rPr lang="en-GB" sz="1600" noProof="1" smtClean="0"/>
+              <a:t>100</a:t>
+            </a:r>
+            <a:endParaRPr lang="en-GB" sz="1600" noProof="1"/>
+          </a:p>
+        </p:txBody>
+      </p:sp>
+      <p:cxnSp>
+        <p:nvCxnSpPr>
+          <p:cNvPr id="23" name="Straight Connector 22"/>
+          <p:cNvCxnSpPr/>
+          <p:nvPr/>
+        </p:nvCxnSpPr>
+        <p:spPr>
+          <a:xfrm>
+            <a:off x="1725515" y="3423780"/>
+            <a:ext cx="3599411" cy="0"/>
+          </a:xfrm>
+          <a:prstGeom prst="line">
+            <a:avLst/>
+          </a:prstGeom>
+          <a:ln>
+            <a:solidFill>
+              <a:srgbClr val="FF0000"/>
+            </a:solidFill>
+            <a:headEnd type="diamond"/>
+            <a:tailEnd type="diamond"/>
+          </a:ln>
+        </p:spPr>
+        <p:style>
+          <a:lnRef idx="1">
+            <a:schemeClr val="accent1"/>
+          </a:lnRef>
+          <a:fillRef idx="0">
+            <a:schemeClr val="accent1"/>
+          </a:fillRef>
+          <a:effectRef idx="0">
+            <a:schemeClr val="accent1"/>
+          </a:effectRef>
+          <a:fontRef idx="minor">
+            <a:schemeClr val="tx1"/>
+          </a:fontRef>
+        </p:style>
+      </p:cxnSp>
+      <p:sp>
+        <p:nvSpPr>
+          <p:cNvPr id="24" name="TextBox 23"/>
+          <p:cNvSpPr txBox="1"/>
+          <p:nvPr/>
+        </p:nvSpPr>
+        <p:spPr>
+          <a:xfrm>
+            <a:off x="1584199" y="3440401"/>
+            <a:ext cx="290945" cy="338554"/>
+          </a:xfrm>
+          <a:prstGeom prst="rect">
+            <a:avLst/>
+          </a:prstGeom>
+          <a:noFill/>
+        </p:spPr>
+        <p:txBody>
+          <a:bodyPr wrap="square" rtlCol="0">
+            <a:spAutoFit/>
+          </a:bodyPr>
+          <a:lstStyle/>
+          <a:p>
+            <a:r>
+              <a:rPr lang="en-GB" sz="1600" noProof="1" smtClean="0">
+                <a:solidFill>
+                  <a:srgbClr val="FF0000"/>
+                </a:solidFill>
+              </a:rPr>
+              <a:t>0</a:t>
+            </a:r>
+            <a:endParaRPr lang="en-GB" sz="1600" noProof="1">
+              <a:solidFill>
+                <a:srgbClr val="FF0000"/>
+              </a:solidFill>
+            </a:endParaRPr>
+          </a:p>
+        </p:txBody>
+      </p:sp>
+      <p:sp>
+        <p:nvSpPr>
+          <p:cNvPr id="25" name="TextBox 24"/>
+          <p:cNvSpPr txBox="1"/>
+          <p:nvPr/>
+        </p:nvSpPr>
+        <p:spPr>
+          <a:xfrm>
+            <a:off x="5096326" y="3448714"/>
+            <a:ext cx="619299" cy="338554"/>
+          </a:xfrm>
+          <a:prstGeom prst="rect">
+            <a:avLst/>
+          </a:prstGeom>
+          <a:noFill/>
+        </p:spPr>
+        <p:txBody>
+          <a:bodyPr wrap="square" rtlCol="0">
+            <a:spAutoFit/>
+          </a:bodyPr>
+          <a:lstStyle/>
+          <a:p>
+            <a:r>
+              <a:rPr lang="en-GB" sz="1600" noProof="1" smtClean="0">
+                <a:solidFill>
+                  <a:srgbClr val="FF0000"/>
+                </a:solidFill>
+              </a:rPr>
+              <a:t>100</a:t>
+            </a:r>
+            <a:endParaRPr lang="en-GB" sz="1600" noProof="1">
+              <a:solidFill>
+                <a:srgbClr val="FF0000"/>
+              </a:solidFill>
+            </a:endParaRPr>
+          </a:p>
+        </p:txBody>
+      </p:sp>
+      <p:sp>
+        <p:nvSpPr>
+          <p:cNvPr id="26" name="TextBox 25"/>
+          <p:cNvSpPr txBox="1"/>
+          <p:nvPr/>
+        </p:nvSpPr>
+        <p:spPr>
+          <a:xfrm>
+            <a:off x="3069772" y="2406666"/>
+            <a:ext cx="1875453" cy="338554"/>
+          </a:xfrm>
+          <a:prstGeom prst="rect">
+            <a:avLst/>
+          </a:prstGeom>
+          <a:noFill/>
+        </p:spPr>
+        <p:txBody>
+          <a:bodyPr wrap="square" rtlCol="0">
+            <a:spAutoFit/>
+          </a:bodyPr>
+          <a:lstStyle/>
+          <a:p>
+            <a:r>
+              <a:rPr lang="en-GB" sz="1600" noProof="1" smtClean="0"/>
+              <a:t>P1 (awg)</a:t>
+            </a:r>
+            <a:endParaRPr lang="en-GB" sz="1600" noProof="1"/>
+          </a:p>
+        </p:txBody>
+      </p:sp>
+      <p:sp>
+        <p:nvSpPr>
+          <p:cNvPr id="27" name="TextBox 26"/>
+          <p:cNvSpPr txBox="1"/>
+          <p:nvPr/>
+        </p:nvSpPr>
+        <p:spPr>
+          <a:xfrm>
+            <a:off x="2761847" y="2922960"/>
+            <a:ext cx="1875453" cy="338554"/>
+          </a:xfrm>
+          <a:prstGeom prst="rect">
+            <a:avLst/>
+          </a:prstGeom>
+          <a:noFill/>
+        </p:spPr>
+        <p:txBody>
+          <a:bodyPr wrap="square" rtlCol="0">
+            <a:spAutoFit/>
+          </a:bodyPr>
+          <a:lstStyle/>
+          <a:p>
+            <a:r>
+              <a:rPr lang="en-GB" sz="1600" noProof="1" smtClean="0"/>
+              <a:t>P2 (awg) delay = -10</a:t>
+            </a:r>
+            <a:endParaRPr lang="en-GB" sz="1600" noProof="1"/>
+          </a:p>
+        </p:txBody>
+      </p:sp>
+      <p:sp>
+        <p:nvSpPr>
+          <p:cNvPr id="28" name="TextBox 27"/>
+          <p:cNvSpPr txBox="1"/>
+          <p:nvPr/>
+        </p:nvSpPr>
+        <p:spPr>
+          <a:xfrm>
+            <a:off x="2294183" y="3447821"/>
+            <a:ext cx="2526183" cy="338554"/>
+          </a:xfrm>
+          <a:prstGeom prst="rect">
+            <a:avLst/>
+          </a:prstGeom>
+          <a:noFill/>
+        </p:spPr>
+        <p:txBody>
+          <a:bodyPr wrap="square" rtlCol="0">
+            <a:spAutoFit/>
+          </a:bodyPr>
+          <a:lstStyle/>
+          <a:p>
+            <a:r>
+              <a:rPr lang="en-GB" sz="1600" noProof="1" smtClean="0">
+                <a:solidFill>
+                  <a:srgbClr val="FF0000"/>
+                </a:solidFill>
+              </a:rPr>
+              <a:t>SD1 (digitizer</a:t>
+            </a:r>
+            <a:r>
+              <a:rPr lang="en-GB" sz="1600" noProof="1" smtClean="0">
+                <a:solidFill>
+                  <a:srgbClr val="FF0000"/>
+                </a:solidFill>
+              </a:rPr>
+              <a:t>)</a:t>
+            </a:r>
+            <a:endParaRPr lang="en-GB" sz="1600" i="1" noProof="1">
+              <a:solidFill>
+                <a:srgbClr val="FF0000"/>
+              </a:solidFill>
+            </a:endParaRPr>
+          </a:p>
+        </p:txBody>
+      </p:sp>
+      <p:cxnSp>
+        <p:nvCxnSpPr>
+          <p:cNvPr id="31" name="Straight Connector 30"/>
+          <p:cNvCxnSpPr/>
+          <p:nvPr/>
+        </p:nvCxnSpPr>
+        <p:spPr>
+          <a:xfrm>
+            <a:off x="5701683" y="2244089"/>
+            <a:ext cx="0" cy="1791477"/>
+          </a:xfrm>
+          <a:prstGeom prst="line">
+            <a:avLst/>
+          </a:prstGeom>
+          <a:ln>
+            <a:solidFill>
+              <a:schemeClr val="accent2">
+                <a:lumMod val="75000"/>
+              </a:schemeClr>
+            </a:solidFill>
+            <a:prstDash val="dash"/>
+          </a:ln>
+        </p:spPr>
+        <p:style>
+          <a:lnRef idx="1">
+            <a:schemeClr val="accent1"/>
+          </a:lnRef>
+          <a:fillRef idx="0">
+            <a:schemeClr val="accent1"/>
+          </a:fillRef>
+          <a:effectRef idx="0">
+            <a:schemeClr val="accent1"/>
+          </a:effectRef>
+          <a:fontRef idx="minor">
+            <a:schemeClr val="tx1"/>
+          </a:fontRef>
+        </p:style>
+      </p:cxnSp>
+      <p:sp>
+        <p:nvSpPr>
+          <p:cNvPr id="32" name="Rectangle 31"/>
+          <p:cNvSpPr/>
+          <p:nvPr/>
+        </p:nvSpPr>
+        <p:spPr>
+          <a:xfrm>
+            <a:off x="8893744" y="6202671"/>
+            <a:ext cx="359941" cy="373224"/>
+          </a:xfrm>
+          <a:prstGeom prst="rect">
+            <a:avLst/>
+          </a:prstGeom>
+        </p:spPr>
+        <p:style>
+          <a:lnRef idx="2">
+            <a:schemeClr val="accent1">
+              <a:shade val="50000"/>
+            </a:schemeClr>
+          </a:lnRef>
+          <a:fillRef idx="1">
+            <a:schemeClr val="accent1"/>
+          </a:fillRef>
+          <a:effectRef idx="0">
+            <a:schemeClr val="accent1"/>
+          </a:effectRef>
+          <a:fontRef idx="minor">
+            <a:schemeClr val="lt1"/>
+          </a:fontRef>
+        </p:style>
+        <p:txBody>
+          <a:bodyPr rtlCol="0" anchor="ctr"/>
+          <a:lstStyle/>
+          <a:p>
+            <a:pPr algn="ctr"/>
+            <a:endParaRPr lang="en-US"/>
+          </a:p>
+        </p:txBody>
+      </p:sp>
+      <p:sp>
+        <p:nvSpPr>
+          <p:cNvPr id="33" name="Rectangle 32"/>
+          <p:cNvSpPr/>
+          <p:nvPr/>
+        </p:nvSpPr>
+        <p:spPr>
+          <a:xfrm>
+            <a:off x="8363113" y="6202671"/>
+            <a:ext cx="359941" cy="373224"/>
+          </a:xfrm>
+          <a:prstGeom prst="rect">
+            <a:avLst/>
+          </a:prstGeom>
+        </p:spPr>
+        <p:style>
+          <a:lnRef idx="2">
+            <a:schemeClr val="accent1">
+              <a:shade val="50000"/>
+            </a:schemeClr>
+          </a:lnRef>
+          <a:fillRef idx="1">
+            <a:schemeClr val="accent1"/>
+          </a:fillRef>
+          <a:effectRef idx="0">
+            <a:schemeClr val="accent1"/>
+          </a:effectRef>
+          <a:fontRef idx="minor">
+            <a:schemeClr val="lt1"/>
+          </a:fontRef>
+        </p:style>
+        <p:txBody>
+          <a:bodyPr rtlCol="0" anchor="ctr"/>
+          <a:lstStyle/>
+          <a:p>
+            <a:pPr algn="ctr"/>
+            <a:endParaRPr lang="en-US"/>
+          </a:p>
+        </p:txBody>
+      </p:sp>
+      <p:cxnSp>
+        <p:nvCxnSpPr>
+          <p:cNvPr id="36" name="Straight Connector 35"/>
+          <p:cNvCxnSpPr/>
+          <p:nvPr/>
+        </p:nvCxnSpPr>
+        <p:spPr>
+          <a:xfrm>
+            <a:off x="1729032" y="2244089"/>
+            <a:ext cx="0" cy="1791477"/>
+          </a:xfrm>
+          <a:prstGeom prst="line">
+            <a:avLst/>
+          </a:prstGeom>
+          <a:ln>
+            <a:solidFill>
+              <a:srgbClr val="00B050"/>
+            </a:solidFill>
+            <a:prstDash val="dash"/>
+          </a:ln>
+        </p:spPr>
+        <p:style>
+          <a:lnRef idx="1">
+            <a:schemeClr val="accent1"/>
+          </a:lnRef>
+          <a:fillRef idx="0">
+            <a:schemeClr val="accent1"/>
+          </a:fillRef>
+          <a:effectRef idx="0">
+            <a:schemeClr val="accent1"/>
+          </a:effectRef>
+          <a:fontRef idx="minor">
+            <a:schemeClr val="tx1"/>
+          </a:fontRef>
+        </p:style>
+      </p:cxnSp>
+      <p:sp>
+        <p:nvSpPr>
+          <p:cNvPr id="40" name="TextBox 39"/>
+          <p:cNvSpPr txBox="1"/>
+          <p:nvPr/>
+        </p:nvSpPr>
+        <p:spPr>
+          <a:xfrm>
+            <a:off x="2902455" y="4041923"/>
+            <a:ext cx="1120172" cy="338554"/>
+          </a:xfrm>
+          <a:prstGeom prst="rect">
+            <a:avLst/>
+          </a:prstGeom>
+          <a:noFill/>
+        </p:spPr>
+        <p:txBody>
+          <a:bodyPr wrap="square" rtlCol="0">
+            <a:spAutoFit/>
+          </a:bodyPr>
+          <a:lstStyle/>
+          <a:p>
+            <a:r>
+              <a:rPr lang="en-GB" sz="1600" i="1" noProof="1" smtClean="0">
+                <a:solidFill>
+                  <a:srgbClr val="00B050"/>
+                </a:solidFill>
+              </a:rPr>
+              <a:t>samples</a:t>
+            </a:r>
+            <a:endParaRPr lang="en-GB" sz="1600" i="1" noProof="1">
+              <a:solidFill>
+                <a:srgbClr val="00B050"/>
+              </a:solidFill>
+            </a:endParaRPr>
+          </a:p>
+        </p:txBody>
+      </p:sp>
+      <p:sp>
+        <p:nvSpPr>
+          <p:cNvPr id="41" name="TextBox 40"/>
+          <p:cNvSpPr txBox="1"/>
+          <p:nvPr/>
+        </p:nvSpPr>
+        <p:spPr>
+          <a:xfrm>
+            <a:off x="1578153" y="4041923"/>
+            <a:ext cx="329215" cy="338554"/>
+          </a:xfrm>
+          <a:prstGeom prst="rect">
+            <a:avLst/>
+          </a:prstGeom>
+          <a:noFill/>
+        </p:spPr>
+        <p:txBody>
+          <a:bodyPr wrap="square" rtlCol="0">
+            <a:spAutoFit/>
+          </a:bodyPr>
+          <a:lstStyle/>
+          <a:p>
+            <a:r>
+              <a:rPr lang="en-GB" sz="1600" i="1" noProof="1" smtClean="0">
+                <a:solidFill>
+                  <a:srgbClr val="00B050"/>
+                </a:solidFill>
+              </a:rPr>
+              <a:t>0</a:t>
+            </a:r>
+            <a:endParaRPr lang="en-GB" sz="1600" i="1" noProof="1">
+              <a:solidFill>
+                <a:srgbClr val="00B050"/>
+              </a:solidFill>
+            </a:endParaRPr>
+          </a:p>
+        </p:txBody>
+      </p:sp>
+      <p:sp>
+        <p:nvSpPr>
+          <p:cNvPr id="42" name="TextBox 41"/>
+          <p:cNvSpPr txBox="1"/>
+          <p:nvPr/>
+        </p:nvSpPr>
+        <p:spPr>
+          <a:xfrm>
+            <a:off x="1929640" y="4041923"/>
+            <a:ext cx="436273" cy="338554"/>
+          </a:xfrm>
+          <a:prstGeom prst="rect">
+            <a:avLst/>
+          </a:prstGeom>
+          <a:noFill/>
+        </p:spPr>
+        <p:txBody>
+          <a:bodyPr wrap="square" rtlCol="0">
+            <a:spAutoFit/>
+          </a:bodyPr>
+          <a:lstStyle/>
+          <a:p>
+            <a:r>
+              <a:rPr lang="en-GB" sz="1600" i="1" noProof="1" smtClean="0">
+                <a:solidFill>
+                  <a:srgbClr val="00B050"/>
+                </a:solidFill>
+              </a:rPr>
+              <a:t>10</a:t>
+            </a:r>
+            <a:endParaRPr lang="en-GB" sz="1600" i="1" noProof="1">
+              <a:solidFill>
+                <a:srgbClr val="00B050"/>
+              </a:solidFill>
+            </a:endParaRPr>
+          </a:p>
+        </p:txBody>
+      </p:sp>
+      <p:sp>
+        <p:nvSpPr>
+          <p:cNvPr id="43" name="TextBox 42"/>
+          <p:cNvSpPr txBox="1"/>
+          <p:nvPr/>
+        </p:nvSpPr>
+        <p:spPr>
+          <a:xfrm>
+            <a:off x="5461822" y="4038168"/>
+            <a:ext cx="586312" cy="338554"/>
+          </a:xfrm>
+          <a:prstGeom prst="rect">
+            <a:avLst/>
+          </a:prstGeom>
+          <a:noFill/>
+        </p:spPr>
+        <p:txBody>
+          <a:bodyPr wrap="square" rtlCol="0">
+            <a:spAutoFit/>
+          </a:bodyPr>
+          <a:lstStyle/>
+          <a:p>
+            <a:r>
+              <a:rPr lang="en-GB" sz="1600" i="1" noProof="1" smtClean="0">
+                <a:solidFill>
+                  <a:srgbClr val="00B050"/>
+                </a:solidFill>
+              </a:rPr>
+              <a:t>110</a:t>
+            </a:r>
+            <a:endParaRPr lang="en-GB" sz="1600" i="1" noProof="1">
+              <a:solidFill>
+                <a:srgbClr val="00B050"/>
+              </a:solidFill>
+            </a:endParaRPr>
+          </a:p>
+        </p:txBody>
+      </p:sp>
+      <p:cxnSp>
+        <p:nvCxnSpPr>
+          <p:cNvPr id="55" name="Straight Connector 54"/>
+          <p:cNvCxnSpPr/>
+          <p:nvPr/>
+        </p:nvCxnSpPr>
+        <p:spPr>
+          <a:xfrm>
+            <a:off x="5695461" y="280817"/>
+            <a:ext cx="0" cy="1629748"/>
+          </a:xfrm>
+          <a:prstGeom prst="line">
+            <a:avLst/>
+          </a:prstGeom>
+          <a:ln>
+            <a:solidFill>
+              <a:schemeClr val="accent2">
+                <a:lumMod val="75000"/>
+              </a:schemeClr>
+            </a:solidFill>
+            <a:prstDash val="dash"/>
+          </a:ln>
+        </p:spPr>
+        <p:style>
+          <a:lnRef idx="1">
+            <a:schemeClr val="accent1"/>
+          </a:lnRef>
+          <a:fillRef idx="0">
+            <a:schemeClr val="accent1"/>
+          </a:fillRef>
+          <a:effectRef idx="0">
+            <a:schemeClr val="accent1"/>
+          </a:effectRef>
+          <a:fontRef idx="minor">
+            <a:schemeClr val="tx1"/>
+          </a:fontRef>
+        </p:style>
+      </p:cxnSp>
+      <p:cxnSp>
+        <p:nvCxnSpPr>
+          <p:cNvPr id="60" name="Straight Connector 59"/>
+          <p:cNvCxnSpPr/>
+          <p:nvPr/>
+        </p:nvCxnSpPr>
+        <p:spPr>
+          <a:xfrm>
+            <a:off x="2102272" y="280817"/>
+            <a:ext cx="0" cy="1629748"/>
+          </a:xfrm>
+          <a:prstGeom prst="line">
+            <a:avLst/>
+          </a:prstGeom>
+          <a:ln>
+            <a:solidFill>
+              <a:schemeClr val="accent2">
+                <a:lumMod val="75000"/>
+              </a:schemeClr>
+            </a:solidFill>
+            <a:prstDash val="dash"/>
+          </a:ln>
+        </p:spPr>
+        <p:style>
+          <a:lnRef idx="1">
+            <a:schemeClr val="accent1"/>
+          </a:lnRef>
+          <a:fillRef idx="0">
+            <a:schemeClr val="accent1"/>
+          </a:fillRef>
+          <a:effectRef idx="0">
+            <a:schemeClr val="accent1"/>
+          </a:effectRef>
+          <a:fontRef idx="minor">
+            <a:schemeClr val="tx1"/>
+          </a:fontRef>
+        </p:style>
+      </p:cxnSp>
+      <p:cxnSp>
+        <p:nvCxnSpPr>
+          <p:cNvPr id="45" name="Straight Connector 44"/>
+          <p:cNvCxnSpPr/>
+          <p:nvPr/>
+        </p:nvCxnSpPr>
+        <p:spPr>
+          <a:xfrm>
+            <a:off x="2102605" y="4613231"/>
+            <a:ext cx="0" cy="1791477"/>
+          </a:xfrm>
+          <a:prstGeom prst="line">
+            <a:avLst/>
+          </a:prstGeom>
+          <a:ln>
+            <a:solidFill>
+              <a:schemeClr val="accent2">
+                <a:lumMod val="75000"/>
+              </a:schemeClr>
+            </a:solidFill>
+            <a:prstDash val="dash"/>
+          </a:ln>
+        </p:spPr>
+        <p:style>
+          <a:lnRef idx="1">
+            <a:schemeClr val="accent1"/>
+          </a:lnRef>
+          <a:fillRef idx="0">
+            <a:schemeClr val="accent1"/>
+          </a:fillRef>
+          <a:effectRef idx="0">
+            <a:schemeClr val="accent1"/>
+          </a:effectRef>
+          <a:fontRef idx="minor">
+            <a:schemeClr val="tx1"/>
+          </a:fontRef>
+        </p:style>
+      </p:cxnSp>
+      <p:cxnSp>
+        <p:nvCxnSpPr>
+          <p:cNvPr id="46" name="Straight Connector 45"/>
+          <p:cNvCxnSpPr/>
+          <p:nvPr/>
+        </p:nvCxnSpPr>
+        <p:spPr>
+          <a:xfrm>
+            <a:off x="2102272" y="4750874"/>
+            <a:ext cx="3599411" cy="0"/>
+          </a:xfrm>
+          <a:prstGeom prst="line">
+            <a:avLst/>
+          </a:prstGeom>
+          <a:ln>
+            <a:headEnd type="diamond"/>
+            <a:tailEnd type="diamond"/>
+          </a:ln>
+        </p:spPr>
+        <p:style>
+          <a:lnRef idx="1">
+            <a:schemeClr val="accent1"/>
+          </a:lnRef>
+          <a:fillRef idx="0">
+            <a:schemeClr val="accent1"/>
+          </a:fillRef>
+          <a:effectRef idx="0">
+            <a:schemeClr val="accent1"/>
+          </a:effectRef>
+          <a:fontRef idx="minor">
+            <a:schemeClr val="tx1"/>
+          </a:fontRef>
+        </p:style>
+      </p:cxnSp>
+      <p:sp>
+        <p:nvSpPr>
+          <p:cNvPr id="47" name="TextBox 46"/>
+          <p:cNvSpPr txBox="1"/>
+          <p:nvPr/>
+        </p:nvSpPr>
+        <p:spPr>
+          <a:xfrm>
+            <a:off x="1960956" y="4767495"/>
+            <a:ext cx="290945" cy="338554"/>
+          </a:xfrm>
+          <a:prstGeom prst="rect">
+            <a:avLst/>
+          </a:prstGeom>
+          <a:noFill/>
+        </p:spPr>
+        <p:txBody>
+          <a:bodyPr wrap="square" rtlCol="0">
+            <a:spAutoFit/>
+          </a:bodyPr>
+          <a:lstStyle/>
+          <a:p>
+            <a:r>
+              <a:rPr lang="en-GB" sz="1600" noProof="1" smtClean="0"/>
+              <a:t>0</a:t>
+            </a:r>
+            <a:endParaRPr lang="en-GB" sz="1600" noProof="1"/>
+          </a:p>
+        </p:txBody>
+      </p:sp>
+      <p:sp>
+        <p:nvSpPr>
+          <p:cNvPr id="48" name="TextBox 47"/>
+          <p:cNvSpPr txBox="1"/>
+          <p:nvPr/>
+        </p:nvSpPr>
+        <p:spPr>
+          <a:xfrm>
+            <a:off x="5473083" y="4775808"/>
+            <a:ext cx="619299" cy="338554"/>
+          </a:xfrm>
+          <a:prstGeom prst="rect">
+            <a:avLst/>
+          </a:prstGeom>
+          <a:noFill/>
+        </p:spPr>
+        <p:txBody>
+          <a:bodyPr wrap="square" rtlCol="0">
+            <a:spAutoFit/>
+          </a:bodyPr>
+          <a:lstStyle/>
+          <a:p>
+            <a:r>
+              <a:rPr lang="en-GB" sz="1600" noProof="1" smtClean="0"/>
+              <a:t>100</a:t>
+            </a:r>
+            <a:endParaRPr lang="en-GB" sz="1600" noProof="1"/>
+          </a:p>
+        </p:txBody>
+      </p:sp>
+      <p:cxnSp>
+        <p:nvCxnSpPr>
+          <p:cNvPr id="49" name="Straight Connector 48"/>
+          <p:cNvCxnSpPr/>
+          <p:nvPr/>
+        </p:nvCxnSpPr>
+        <p:spPr>
+          <a:xfrm>
+            <a:off x="1729032" y="5267168"/>
+            <a:ext cx="3599411" cy="0"/>
+          </a:xfrm>
+          <a:prstGeom prst="line">
+            <a:avLst/>
+          </a:prstGeom>
+          <a:ln>
+            <a:headEnd type="diamond"/>
+            <a:tailEnd type="diamond"/>
+          </a:ln>
+        </p:spPr>
+        <p:style>
+          <a:lnRef idx="1">
+            <a:schemeClr val="accent1"/>
+          </a:lnRef>
+          <a:fillRef idx="0">
+            <a:schemeClr val="accent1"/>
+          </a:fillRef>
+          <a:effectRef idx="0">
+            <a:schemeClr val="accent1"/>
+          </a:effectRef>
+          <a:fontRef idx="minor">
+            <a:schemeClr val="tx1"/>
+          </a:fontRef>
+        </p:style>
+      </p:cxnSp>
+      <p:sp>
+        <p:nvSpPr>
+          <p:cNvPr id="50" name="TextBox 49"/>
+          <p:cNvSpPr txBox="1"/>
+          <p:nvPr/>
+        </p:nvSpPr>
+        <p:spPr>
+          <a:xfrm>
+            <a:off x="1587716" y="5283789"/>
+            <a:ext cx="290945" cy="338554"/>
+          </a:xfrm>
+          <a:prstGeom prst="rect">
+            <a:avLst/>
+          </a:prstGeom>
+          <a:noFill/>
+        </p:spPr>
+        <p:txBody>
+          <a:bodyPr wrap="square" rtlCol="0">
+            <a:spAutoFit/>
+          </a:bodyPr>
+          <a:lstStyle/>
+          <a:p>
+            <a:r>
+              <a:rPr lang="en-GB" sz="1600" noProof="1" smtClean="0"/>
+              <a:t>0</a:t>
+            </a:r>
+            <a:endParaRPr lang="en-GB" sz="1600" noProof="1"/>
+          </a:p>
+        </p:txBody>
+      </p:sp>
+      <p:sp>
+        <p:nvSpPr>
+          <p:cNvPr id="51" name="TextBox 50"/>
+          <p:cNvSpPr txBox="1"/>
+          <p:nvPr/>
+        </p:nvSpPr>
+        <p:spPr>
+          <a:xfrm>
+            <a:off x="5099843" y="5292102"/>
+            <a:ext cx="619299" cy="338554"/>
+          </a:xfrm>
+          <a:prstGeom prst="rect">
+            <a:avLst/>
+          </a:prstGeom>
+          <a:noFill/>
+        </p:spPr>
+        <p:txBody>
+          <a:bodyPr wrap="square" rtlCol="0">
+            <a:spAutoFit/>
+          </a:bodyPr>
+          <a:lstStyle/>
+          <a:p>
+            <a:r>
+              <a:rPr lang="en-GB" sz="1600" noProof="1" smtClean="0"/>
+              <a:t>100</a:t>
+            </a:r>
+            <a:endParaRPr lang="en-GB" sz="1600" noProof="1"/>
+          </a:p>
+        </p:txBody>
+      </p:sp>
+      <p:cxnSp>
+        <p:nvCxnSpPr>
+          <p:cNvPr id="52" name="Straight Connector 51"/>
+          <p:cNvCxnSpPr/>
+          <p:nvPr/>
+        </p:nvCxnSpPr>
+        <p:spPr>
+          <a:xfrm>
+            <a:off x="2099586" y="5792922"/>
+            <a:ext cx="3599411" cy="0"/>
+          </a:xfrm>
+          <a:prstGeom prst="line">
+            <a:avLst/>
+          </a:prstGeom>
+          <a:ln>
+            <a:headEnd type="diamond"/>
+            <a:tailEnd type="diamond"/>
+          </a:ln>
+        </p:spPr>
+        <p:style>
+          <a:lnRef idx="1">
+            <a:schemeClr val="accent1"/>
+          </a:lnRef>
+          <a:fillRef idx="0">
+            <a:schemeClr val="accent1"/>
+          </a:fillRef>
+          <a:effectRef idx="0">
+            <a:schemeClr val="accent1"/>
+          </a:effectRef>
+          <a:fontRef idx="minor">
+            <a:schemeClr val="tx1"/>
+          </a:fontRef>
+        </p:style>
+      </p:cxnSp>
+      <p:sp>
+        <p:nvSpPr>
+          <p:cNvPr id="53" name="TextBox 52"/>
+          <p:cNvSpPr txBox="1"/>
+          <p:nvPr/>
+        </p:nvSpPr>
+        <p:spPr>
+          <a:xfrm>
+            <a:off x="1958270" y="5809543"/>
+            <a:ext cx="290945" cy="338554"/>
+          </a:xfrm>
+          <a:prstGeom prst="rect">
+            <a:avLst/>
+          </a:prstGeom>
+          <a:noFill/>
+        </p:spPr>
+        <p:txBody>
+          <a:bodyPr wrap="square" rtlCol="0">
+            <a:spAutoFit/>
+          </a:bodyPr>
+          <a:lstStyle/>
+          <a:p>
+            <a:r>
+              <a:rPr lang="en-GB" sz="1600" noProof="1" smtClean="0"/>
+              <a:t>0</a:t>
+            </a:r>
+            <a:endParaRPr lang="en-GB" sz="1600" noProof="1"/>
+          </a:p>
+        </p:txBody>
+      </p:sp>
+      <p:sp>
+        <p:nvSpPr>
+          <p:cNvPr id="54" name="TextBox 53"/>
+          <p:cNvSpPr txBox="1"/>
+          <p:nvPr/>
+        </p:nvSpPr>
+        <p:spPr>
+          <a:xfrm>
+            <a:off x="5470397" y="5817856"/>
+            <a:ext cx="619299" cy="338554"/>
+          </a:xfrm>
+          <a:prstGeom prst="rect">
+            <a:avLst/>
+          </a:prstGeom>
+          <a:noFill/>
+        </p:spPr>
+        <p:txBody>
+          <a:bodyPr wrap="square" rtlCol="0">
+            <a:spAutoFit/>
+          </a:bodyPr>
+          <a:lstStyle/>
+          <a:p>
+            <a:r>
+              <a:rPr lang="en-GB" sz="1600" noProof="1" smtClean="0"/>
+              <a:t>100</a:t>
+            </a:r>
+            <a:endParaRPr lang="en-GB" sz="1600" noProof="1"/>
+          </a:p>
+        </p:txBody>
+      </p:sp>
+      <p:sp>
+        <p:nvSpPr>
+          <p:cNvPr id="56" name="TextBox 55"/>
+          <p:cNvSpPr txBox="1"/>
+          <p:nvPr/>
+        </p:nvSpPr>
+        <p:spPr>
+          <a:xfrm>
+            <a:off x="3069772" y="4775808"/>
+            <a:ext cx="1875453" cy="338554"/>
+          </a:xfrm>
+          <a:prstGeom prst="rect">
+            <a:avLst/>
+          </a:prstGeom>
+          <a:noFill/>
+        </p:spPr>
+        <p:txBody>
+          <a:bodyPr wrap="square" rtlCol="0">
+            <a:spAutoFit/>
+          </a:bodyPr>
+          <a:lstStyle/>
+          <a:p>
+            <a:r>
+              <a:rPr lang="en-GB" sz="1600" noProof="1" smtClean="0"/>
+              <a:t>P1 (awg)</a:t>
+            </a:r>
+            <a:endParaRPr lang="en-GB" sz="1600" noProof="1"/>
+          </a:p>
+        </p:txBody>
+      </p:sp>
+      <p:sp>
+        <p:nvSpPr>
+          <p:cNvPr id="57" name="TextBox 56"/>
+          <p:cNvSpPr txBox="1"/>
+          <p:nvPr/>
+        </p:nvSpPr>
+        <p:spPr>
+          <a:xfrm>
+            <a:off x="2761847" y="5292102"/>
+            <a:ext cx="1875453" cy="338554"/>
+          </a:xfrm>
+          <a:prstGeom prst="rect">
+            <a:avLst/>
+          </a:prstGeom>
+          <a:noFill/>
+        </p:spPr>
+        <p:txBody>
+          <a:bodyPr wrap="square" rtlCol="0">
+            <a:spAutoFit/>
+          </a:bodyPr>
+          <a:lstStyle/>
+          <a:p>
+            <a:r>
+              <a:rPr lang="en-GB" sz="1600" noProof="1" smtClean="0"/>
+              <a:t>P2 (awg) delay = -10</a:t>
+            </a:r>
+            <a:endParaRPr lang="en-GB" sz="1600" noProof="1"/>
+          </a:p>
+        </p:txBody>
+      </p:sp>
+      <p:sp>
+        <p:nvSpPr>
+          <p:cNvPr id="58" name="TextBox 57"/>
+          <p:cNvSpPr txBox="1"/>
+          <p:nvPr/>
+        </p:nvSpPr>
+        <p:spPr>
+          <a:xfrm>
+            <a:off x="2668254" y="5816963"/>
+            <a:ext cx="2526183" cy="338554"/>
+          </a:xfrm>
+          <a:prstGeom prst="rect">
+            <a:avLst/>
+          </a:prstGeom>
+          <a:noFill/>
+        </p:spPr>
+        <p:txBody>
+          <a:bodyPr wrap="square" rtlCol="0">
+            <a:spAutoFit/>
+          </a:bodyPr>
+          <a:lstStyle/>
+          <a:p>
+            <a:r>
+              <a:rPr lang="en-GB" sz="1600" noProof="1" smtClean="0"/>
+              <a:t>SD1 (digitizer</a:t>
+            </a:r>
+            <a:r>
+              <a:rPr lang="en-GB" sz="1600" noProof="1" smtClean="0"/>
+              <a:t>)</a:t>
+            </a:r>
+            <a:endParaRPr lang="en-GB" sz="1600" noProof="1"/>
+          </a:p>
+        </p:txBody>
+      </p:sp>
+      <p:cxnSp>
+        <p:nvCxnSpPr>
+          <p:cNvPr id="59" name="Straight Connector 58"/>
+          <p:cNvCxnSpPr/>
+          <p:nvPr/>
+        </p:nvCxnSpPr>
+        <p:spPr>
+          <a:xfrm>
+            <a:off x="5701683" y="4613231"/>
+            <a:ext cx="0" cy="1791477"/>
+          </a:xfrm>
+          <a:prstGeom prst="line">
+            <a:avLst/>
+          </a:prstGeom>
+          <a:ln>
+            <a:solidFill>
+              <a:schemeClr val="accent2">
+                <a:lumMod val="75000"/>
+              </a:schemeClr>
+            </a:solidFill>
+            <a:prstDash val="dash"/>
+          </a:ln>
+        </p:spPr>
+        <p:style>
+          <a:lnRef idx="1">
+            <a:schemeClr val="accent1"/>
+          </a:lnRef>
+          <a:fillRef idx="0">
+            <a:schemeClr val="accent1"/>
+          </a:fillRef>
+          <a:effectRef idx="0">
+            <a:schemeClr val="accent1"/>
+          </a:effectRef>
+          <a:fontRef idx="minor">
+            <a:schemeClr val="tx1"/>
+          </a:fontRef>
+        </p:style>
+      </p:cxnSp>
+      <p:cxnSp>
+        <p:nvCxnSpPr>
+          <p:cNvPr id="61" name="Straight Connector 60"/>
+          <p:cNvCxnSpPr/>
+          <p:nvPr/>
+        </p:nvCxnSpPr>
+        <p:spPr>
+          <a:xfrm>
+            <a:off x="1729032" y="4613231"/>
+            <a:ext cx="0" cy="1791477"/>
+          </a:xfrm>
+          <a:prstGeom prst="line">
+            <a:avLst/>
+          </a:prstGeom>
+          <a:ln>
+            <a:solidFill>
+              <a:srgbClr val="00B050"/>
+            </a:solidFill>
+            <a:prstDash val="dash"/>
+          </a:ln>
+        </p:spPr>
+        <p:style>
+          <a:lnRef idx="1">
+            <a:schemeClr val="accent1"/>
+          </a:lnRef>
+          <a:fillRef idx="0">
+            <a:schemeClr val="accent1"/>
+          </a:fillRef>
+          <a:effectRef idx="0">
+            <a:schemeClr val="accent1"/>
+          </a:effectRef>
+          <a:fontRef idx="minor">
+            <a:schemeClr val="tx1"/>
+          </a:fontRef>
+        </p:style>
+      </p:cxnSp>
+      <p:sp>
+        <p:nvSpPr>
+          <p:cNvPr id="63" name="TextBox 62"/>
+          <p:cNvSpPr txBox="1"/>
+          <p:nvPr/>
+        </p:nvSpPr>
+        <p:spPr>
+          <a:xfrm>
+            <a:off x="2902455" y="6386126"/>
+            <a:ext cx="1120172" cy="338554"/>
+          </a:xfrm>
+          <a:prstGeom prst="rect">
+            <a:avLst/>
+          </a:prstGeom>
+          <a:noFill/>
+        </p:spPr>
+        <p:txBody>
+          <a:bodyPr wrap="square" rtlCol="0">
+            <a:spAutoFit/>
+          </a:bodyPr>
+          <a:lstStyle/>
+          <a:p>
+            <a:r>
+              <a:rPr lang="en-GB" sz="1600" i="1" noProof="1" smtClean="0">
+                <a:solidFill>
+                  <a:srgbClr val="00B050"/>
+                </a:solidFill>
+              </a:rPr>
+              <a:t>samples</a:t>
+            </a:r>
+            <a:endParaRPr lang="en-GB" sz="1600" i="1" noProof="1">
+              <a:solidFill>
+                <a:srgbClr val="00B050"/>
+              </a:solidFill>
+            </a:endParaRPr>
+          </a:p>
+        </p:txBody>
+      </p:sp>
+      <p:sp>
+        <p:nvSpPr>
+          <p:cNvPr id="64" name="TextBox 63"/>
+          <p:cNvSpPr txBox="1"/>
+          <p:nvPr/>
+        </p:nvSpPr>
+        <p:spPr>
+          <a:xfrm>
+            <a:off x="1578153" y="6386126"/>
+            <a:ext cx="329215" cy="338554"/>
+          </a:xfrm>
+          <a:prstGeom prst="rect">
+            <a:avLst/>
+          </a:prstGeom>
+          <a:noFill/>
+        </p:spPr>
+        <p:txBody>
+          <a:bodyPr wrap="square" rtlCol="0">
+            <a:spAutoFit/>
+          </a:bodyPr>
+          <a:lstStyle/>
+          <a:p>
+            <a:r>
+              <a:rPr lang="en-GB" sz="1600" i="1" noProof="1" smtClean="0">
+                <a:solidFill>
+                  <a:srgbClr val="00B050"/>
+                </a:solidFill>
+              </a:rPr>
+              <a:t>0</a:t>
+            </a:r>
+            <a:endParaRPr lang="en-GB" sz="1600" i="1" noProof="1">
+              <a:solidFill>
+                <a:srgbClr val="00B050"/>
+              </a:solidFill>
+            </a:endParaRPr>
+          </a:p>
+        </p:txBody>
+      </p:sp>
+      <p:sp>
+        <p:nvSpPr>
+          <p:cNvPr id="65" name="TextBox 64"/>
+          <p:cNvSpPr txBox="1"/>
+          <p:nvPr/>
+        </p:nvSpPr>
+        <p:spPr>
+          <a:xfrm>
+            <a:off x="1929640" y="6386126"/>
+            <a:ext cx="436273" cy="338554"/>
+          </a:xfrm>
+          <a:prstGeom prst="rect">
+            <a:avLst/>
+          </a:prstGeom>
+          <a:noFill/>
+        </p:spPr>
+        <p:txBody>
+          <a:bodyPr wrap="square" rtlCol="0">
+            <a:spAutoFit/>
+          </a:bodyPr>
+          <a:lstStyle/>
+          <a:p>
+            <a:r>
+              <a:rPr lang="en-GB" sz="1600" i="1" noProof="1" smtClean="0">
+                <a:solidFill>
+                  <a:srgbClr val="00B050"/>
+                </a:solidFill>
+              </a:rPr>
+              <a:t>10</a:t>
+            </a:r>
+            <a:endParaRPr lang="en-GB" sz="1600" i="1" noProof="1">
+              <a:solidFill>
+                <a:srgbClr val="00B050"/>
+              </a:solidFill>
+            </a:endParaRPr>
+          </a:p>
+        </p:txBody>
+      </p:sp>
+      <p:sp>
+        <p:nvSpPr>
+          <p:cNvPr id="66" name="TextBox 65"/>
+          <p:cNvSpPr txBox="1"/>
+          <p:nvPr/>
+        </p:nvSpPr>
+        <p:spPr>
+          <a:xfrm>
+            <a:off x="5461822" y="6382371"/>
+            <a:ext cx="586312" cy="338554"/>
+          </a:xfrm>
+          <a:prstGeom prst="rect">
+            <a:avLst/>
+          </a:prstGeom>
+          <a:noFill/>
+        </p:spPr>
+        <p:txBody>
+          <a:bodyPr wrap="square" rtlCol="0">
+            <a:spAutoFit/>
+          </a:bodyPr>
+          <a:lstStyle/>
+          <a:p>
+            <a:r>
+              <a:rPr lang="en-GB" sz="1600" i="1" noProof="1" smtClean="0">
+                <a:solidFill>
+                  <a:srgbClr val="00B050"/>
+                </a:solidFill>
+              </a:rPr>
+              <a:t>110</a:t>
+            </a:r>
+            <a:endParaRPr lang="en-GB" sz="1600" i="1" noProof="1">
+              <a:solidFill>
+                <a:srgbClr val="00B050"/>
+              </a:solidFill>
+            </a:endParaRPr>
+          </a:p>
+        </p:txBody>
+      </p:sp>
+    </p:spTree>
+    <p:extLst>
+      <p:ext uri="{BB962C8B-B14F-4D97-AF65-F5344CB8AC3E}">
+        <p14:creationId xmlns:p14="http://schemas.microsoft.com/office/powerpoint/2010/main" val="3269838236"/>
+      </p:ext>
+    </p:extLst>
+  </p:cSld>
+  <p:clrMapOvr>
+    <a:masterClrMapping/>
+  </p:clrMapOvr>
 </p:sld>
 </file>
 

</xml_diff>